<commit_message>
Added linkNegotationStart/End to the processing model
</commit_message>
<xml_diff>
--- a/nt-charts.pptx
+++ b/nt-charts.pptx
@@ -1,12 +1,11 @@
 
 <file path=ppt/presentation.xml><?xml version="1.0" encoding="utf-8"?>
-<p:presentation xmlns:a="http://schemas.openxmlformats.org/drawingml/2006/main" xmlns:r="http://schemas.openxmlformats.org/officeDocument/2006/relationships" xmlns:p="http://schemas.openxmlformats.org/presentationml/2006/main" saveSubsetFonts="1">
+<p:presentation xmlns:a="http://schemas.openxmlformats.org/drawingml/2006/main" xmlns:r="http://schemas.openxmlformats.org/officeDocument/2006/relationships" xmlns:mc="http://schemas.openxmlformats.org/markup-compatibility/2006" xmlns:mv="urn:schemas-microsoft-com:mac:vml" xmlns:p="http://schemas.openxmlformats.org/presentationml/2006/main" mc:Ignorable="mv" mc:PreserveAttributes="mv:*" saveSubsetFonts="1">
   <p:sldMasterIdLst>
     <p:sldMasterId id="2147483648" r:id="rId1"/>
   </p:sldMasterIdLst>
   <p:sldIdLst>
-    <p:sldId id="256" r:id="rId2"/>
-    <p:sldId id="257" r:id="rId3"/>
+    <p:sldId id="257" r:id="rId2"/>
   </p:sldIdLst>
   <p:sldSz cx="9144000" cy="6858000" type="screen4x3"/>
   <p:notesSz cx="6858000" cy="9144000"/>
@@ -109,7 +108,7 @@
 </file>
 
 <file path=ppt/slideLayouts/slideLayout1.xml><?xml version="1.0" encoding="utf-8"?>
-<p:sldLayout xmlns:a="http://schemas.openxmlformats.org/drawingml/2006/main" xmlns:r="http://schemas.openxmlformats.org/officeDocument/2006/relationships" xmlns:p="http://schemas.openxmlformats.org/presentationml/2006/main" type="title" preserve="1">
+<p:sldLayout xmlns:a="http://schemas.openxmlformats.org/drawingml/2006/main" xmlns:r="http://schemas.openxmlformats.org/officeDocument/2006/relationships" xmlns:mc="http://schemas.openxmlformats.org/markup-compatibility/2006" xmlns:mv="urn:schemas-microsoft-com:mac:vml" xmlns:p="http://schemas.openxmlformats.org/presentationml/2006/main" mc:Ignorable="mv" mc:PreserveAttributes="mv:*" type="title" preserve="1">
   <p:cSld name="Title Slide">
     <p:spTree>
       <p:nvGrpSpPr>
@@ -290,7 +289,7 @@
             <a:fld id="{1D8BD707-D9CF-40AE-B4C6-C98DA3205C09}" type="datetimeFigureOut">
               <a:rPr lang="en-US" smtClean="0"/>
               <a:pPr/>
-              <a:t>10/19/2011</a:t>
+              <a:t>8/27/12</a:t>
             </a:fld>
             <a:endParaRPr lang="en-US"/>
           </a:p>
@@ -348,7 +347,7 @@
 </file>
 
 <file path=ppt/slideLayouts/slideLayout10.xml><?xml version="1.0" encoding="utf-8"?>
-<p:sldLayout xmlns:a="http://schemas.openxmlformats.org/drawingml/2006/main" xmlns:r="http://schemas.openxmlformats.org/officeDocument/2006/relationships" xmlns:p="http://schemas.openxmlformats.org/presentationml/2006/main" type="vertTx" preserve="1">
+<p:sldLayout xmlns:a="http://schemas.openxmlformats.org/drawingml/2006/main" xmlns:r="http://schemas.openxmlformats.org/officeDocument/2006/relationships" xmlns:mc="http://schemas.openxmlformats.org/markup-compatibility/2006" xmlns:mv="urn:schemas-microsoft-com:mac:vml" xmlns:p="http://schemas.openxmlformats.org/presentationml/2006/main" mc:Ignorable="mv" mc:PreserveAttributes="mv:*" type="vertTx" preserve="1">
   <p:cSld name="Title and Vertical Text">
     <p:spTree>
       <p:nvGrpSpPr>
@@ -457,7 +456,7 @@
             <a:fld id="{1D8BD707-D9CF-40AE-B4C6-C98DA3205C09}" type="datetimeFigureOut">
               <a:rPr lang="en-US" smtClean="0"/>
               <a:pPr/>
-              <a:t>10/19/2011</a:t>
+              <a:t>8/27/12</a:t>
             </a:fld>
             <a:endParaRPr lang="en-US"/>
           </a:p>
@@ -515,7 +514,7 @@
 </file>
 
 <file path=ppt/slideLayouts/slideLayout11.xml><?xml version="1.0" encoding="utf-8"?>
-<p:sldLayout xmlns:a="http://schemas.openxmlformats.org/drawingml/2006/main" xmlns:r="http://schemas.openxmlformats.org/officeDocument/2006/relationships" xmlns:p="http://schemas.openxmlformats.org/presentationml/2006/main" type="vertTitleAndTx" preserve="1">
+<p:sldLayout xmlns:a="http://schemas.openxmlformats.org/drawingml/2006/main" xmlns:r="http://schemas.openxmlformats.org/officeDocument/2006/relationships" xmlns:mc="http://schemas.openxmlformats.org/markup-compatibility/2006" xmlns:mv="urn:schemas-microsoft-com:mac:vml" xmlns:p="http://schemas.openxmlformats.org/presentationml/2006/main" mc:Ignorable="mv" mc:PreserveAttributes="mv:*" type="vertTitleAndTx" preserve="1">
   <p:cSld name="Vertical Title and Text">
     <p:spTree>
       <p:nvGrpSpPr>
@@ -634,7 +633,7 @@
             <a:fld id="{1D8BD707-D9CF-40AE-B4C6-C98DA3205C09}" type="datetimeFigureOut">
               <a:rPr lang="en-US" smtClean="0"/>
               <a:pPr/>
-              <a:t>10/19/2011</a:t>
+              <a:t>8/27/12</a:t>
             </a:fld>
             <a:endParaRPr lang="en-US"/>
           </a:p>
@@ -692,7 +691,7 @@
 </file>
 
 <file path=ppt/slideLayouts/slideLayout2.xml><?xml version="1.0" encoding="utf-8"?>
-<p:sldLayout xmlns:a="http://schemas.openxmlformats.org/drawingml/2006/main" xmlns:r="http://schemas.openxmlformats.org/officeDocument/2006/relationships" xmlns:p="http://schemas.openxmlformats.org/presentationml/2006/main" type="obj" preserve="1">
+<p:sldLayout xmlns:a="http://schemas.openxmlformats.org/drawingml/2006/main" xmlns:r="http://schemas.openxmlformats.org/officeDocument/2006/relationships" xmlns:mc="http://schemas.openxmlformats.org/markup-compatibility/2006" xmlns:mv="urn:schemas-microsoft-com:mac:vml" xmlns:p="http://schemas.openxmlformats.org/presentationml/2006/main" mc:Ignorable="mv" mc:PreserveAttributes="mv:*" type="obj" preserve="1">
   <p:cSld name="Title and Content">
     <p:spTree>
       <p:nvGrpSpPr>
@@ -801,7 +800,7 @@
             <a:fld id="{1D8BD707-D9CF-40AE-B4C6-C98DA3205C09}" type="datetimeFigureOut">
               <a:rPr lang="en-US" smtClean="0"/>
               <a:pPr/>
-              <a:t>10/19/2011</a:t>
+              <a:t>8/27/12</a:t>
             </a:fld>
             <a:endParaRPr lang="en-US"/>
           </a:p>
@@ -859,7 +858,7 @@
 </file>
 
 <file path=ppt/slideLayouts/slideLayout3.xml><?xml version="1.0" encoding="utf-8"?>
-<p:sldLayout xmlns:a="http://schemas.openxmlformats.org/drawingml/2006/main" xmlns:r="http://schemas.openxmlformats.org/officeDocument/2006/relationships" xmlns:p="http://schemas.openxmlformats.org/presentationml/2006/main" type="secHead" preserve="1">
+<p:sldLayout xmlns:a="http://schemas.openxmlformats.org/drawingml/2006/main" xmlns:r="http://schemas.openxmlformats.org/officeDocument/2006/relationships" xmlns:mc="http://schemas.openxmlformats.org/markup-compatibility/2006" xmlns:mv="urn:schemas-microsoft-com:mac:vml" xmlns:p="http://schemas.openxmlformats.org/presentationml/2006/main" mc:Ignorable="mv" mc:PreserveAttributes="mv:*" type="secHead" preserve="1">
   <p:cSld name="Section Header">
     <p:spTree>
       <p:nvGrpSpPr>
@@ -1044,7 +1043,7 @@
             <a:fld id="{1D8BD707-D9CF-40AE-B4C6-C98DA3205C09}" type="datetimeFigureOut">
               <a:rPr lang="en-US" smtClean="0"/>
               <a:pPr/>
-              <a:t>10/19/2011</a:t>
+              <a:t>8/27/12</a:t>
             </a:fld>
             <a:endParaRPr lang="en-US"/>
           </a:p>
@@ -1102,7 +1101,7 @@
 </file>
 
 <file path=ppt/slideLayouts/slideLayout4.xml><?xml version="1.0" encoding="utf-8"?>
-<p:sldLayout xmlns:a="http://schemas.openxmlformats.org/drawingml/2006/main" xmlns:r="http://schemas.openxmlformats.org/officeDocument/2006/relationships" xmlns:p="http://schemas.openxmlformats.org/presentationml/2006/main" type="twoObj" preserve="1">
+<p:sldLayout xmlns:a="http://schemas.openxmlformats.org/drawingml/2006/main" xmlns:r="http://schemas.openxmlformats.org/officeDocument/2006/relationships" xmlns:mc="http://schemas.openxmlformats.org/markup-compatibility/2006" xmlns:mv="urn:schemas-microsoft-com:mac:vml" xmlns:p="http://schemas.openxmlformats.org/presentationml/2006/main" mc:Ignorable="mv" mc:PreserveAttributes="mv:*" type="twoObj" preserve="1">
   <p:cSld name="Two Content">
     <p:spTree>
       <p:nvGrpSpPr>
@@ -1329,7 +1328,7 @@
             <a:fld id="{1D8BD707-D9CF-40AE-B4C6-C98DA3205C09}" type="datetimeFigureOut">
               <a:rPr lang="en-US" smtClean="0"/>
               <a:pPr/>
-              <a:t>10/19/2011</a:t>
+              <a:t>8/27/12</a:t>
             </a:fld>
             <a:endParaRPr lang="en-US"/>
           </a:p>
@@ -1387,7 +1386,7 @@
 </file>
 
 <file path=ppt/slideLayouts/slideLayout5.xml><?xml version="1.0" encoding="utf-8"?>
-<p:sldLayout xmlns:a="http://schemas.openxmlformats.org/drawingml/2006/main" xmlns:r="http://schemas.openxmlformats.org/officeDocument/2006/relationships" xmlns:p="http://schemas.openxmlformats.org/presentationml/2006/main" type="twoTxTwoObj" preserve="1">
+<p:sldLayout xmlns:a="http://schemas.openxmlformats.org/drawingml/2006/main" xmlns:r="http://schemas.openxmlformats.org/officeDocument/2006/relationships" xmlns:mc="http://schemas.openxmlformats.org/markup-compatibility/2006" xmlns:mv="urn:schemas-microsoft-com:mac:vml" xmlns:p="http://schemas.openxmlformats.org/presentationml/2006/main" mc:Ignorable="mv" mc:PreserveAttributes="mv:*" type="twoTxTwoObj" preserve="1">
   <p:cSld name="Comparison">
     <p:spTree>
       <p:nvGrpSpPr>
@@ -1748,7 +1747,7 @@
             <a:fld id="{1D8BD707-D9CF-40AE-B4C6-C98DA3205C09}" type="datetimeFigureOut">
               <a:rPr lang="en-US" smtClean="0"/>
               <a:pPr/>
-              <a:t>10/19/2011</a:t>
+              <a:t>8/27/12</a:t>
             </a:fld>
             <a:endParaRPr lang="en-US"/>
           </a:p>
@@ -1806,7 +1805,7 @@
 </file>
 
 <file path=ppt/slideLayouts/slideLayout6.xml><?xml version="1.0" encoding="utf-8"?>
-<p:sldLayout xmlns:a="http://schemas.openxmlformats.org/drawingml/2006/main" xmlns:r="http://schemas.openxmlformats.org/officeDocument/2006/relationships" xmlns:p="http://schemas.openxmlformats.org/presentationml/2006/main" type="titleOnly" preserve="1">
+<p:sldLayout xmlns:a="http://schemas.openxmlformats.org/drawingml/2006/main" xmlns:r="http://schemas.openxmlformats.org/officeDocument/2006/relationships" xmlns:mc="http://schemas.openxmlformats.org/markup-compatibility/2006" xmlns:mv="urn:schemas-microsoft-com:mac:vml" xmlns:p="http://schemas.openxmlformats.org/presentationml/2006/main" mc:Ignorable="mv" mc:PreserveAttributes="mv:*" type="titleOnly" preserve="1">
   <p:cSld name="Title Only">
     <p:spTree>
       <p:nvGrpSpPr>
@@ -1863,7 +1862,7 @@
             <a:fld id="{1D8BD707-D9CF-40AE-B4C6-C98DA3205C09}" type="datetimeFigureOut">
               <a:rPr lang="en-US" smtClean="0"/>
               <a:pPr/>
-              <a:t>10/19/2011</a:t>
+              <a:t>8/27/12</a:t>
             </a:fld>
             <a:endParaRPr lang="en-US"/>
           </a:p>
@@ -1921,7 +1920,7 @@
 </file>
 
 <file path=ppt/slideLayouts/slideLayout7.xml><?xml version="1.0" encoding="utf-8"?>
-<p:sldLayout xmlns:a="http://schemas.openxmlformats.org/drawingml/2006/main" xmlns:r="http://schemas.openxmlformats.org/officeDocument/2006/relationships" xmlns:p="http://schemas.openxmlformats.org/presentationml/2006/main" type="blank" preserve="1">
+<p:sldLayout xmlns:a="http://schemas.openxmlformats.org/drawingml/2006/main" xmlns:r="http://schemas.openxmlformats.org/officeDocument/2006/relationships" xmlns:mc="http://schemas.openxmlformats.org/markup-compatibility/2006" xmlns:mv="urn:schemas-microsoft-com:mac:vml" xmlns:p="http://schemas.openxmlformats.org/presentationml/2006/main" mc:Ignorable="mv" mc:PreserveAttributes="mv:*" type="blank" preserve="1">
   <p:cSld name="Blank">
     <p:spTree>
       <p:nvGrpSpPr>
@@ -1955,7 +1954,7 @@
             <a:fld id="{1D8BD707-D9CF-40AE-B4C6-C98DA3205C09}" type="datetimeFigureOut">
               <a:rPr lang="en-US" smtClean="0"/>
               <a:pPr/>
-              <a:t>10/19/2011</a:t>
+              <a:t>8/27/12</a:t>
             </a:fld>
             <a:endParaRPr lang="en-US"/>
           </a:p>
@@ -2013,7 +2012,7 @@
 </file>
 
 <file path=ppt/slideLayouts/slideLayout8.xml><?xml version="1.0" encoding="utf-8"?>
-<p:sldLayout xmlns:a="http://schemas.openxmlformats.org/drawingml/2006/main" xmlns:r="http://schemas.openxmlformats.org/officeDocument/2006/relationships" xmlns:p="http://schemas.openxmlformats.org/presentationml/2006/main" type="objTx" preserve="1">
+<p:sldLayout xmlns:a="http://schemas.openxmlformats.org/drawingml/2006/main" xmlns:r="http://schemas.openxmlformats.org/officeDocument/2006/relationships" xmlns:mc="http://schemas.openxmlformats.org/markup-compatibility/2006" xmlns:mv="urn:schemas-microsoft-com:mac:vml" xmlns:p="http://schemas.openxmlformats.org/presentationml/2006/main" mc:Ignorable="mv" mc:PreserveAttributes="mv:*" type="objTx" preserve="1">
   <p:cSld name="Content with Caption">
     <p:spTree>
       <p:nvGrpSpPr>
@@ -2229,7 +2228,7 @@
             <a:fld id="{1D8BD707-D9CF-40AE-B4C6-C98DA3205C09}" type="datetimeFigureOut">
               <a:rPr lang="en-US" smtClean="0"/>
               <a:pPr/>
-              <a:t>10/19/2011</a:t>
+              <a:t>8/27/12</a:t>
             </a:fld>
             <a:endParaRPr lang="en-US"/>
           </a:p>
@@ -2287,7 +2286,7 @@
 </file>
 
 <file path=ppt/slideLayouts/slideLayout9.xml><?xml version="1.0" encoding="utf-8"?>
-<p:sldLayout xmlns:a="http://schemas.openxmlformats.org/drawingml/2006/main" xmlns:r="http://schemas.openxmlformats.org/officeDocument/2006/relationships" xmlns:p="http://schemas.openxmlformats.org/presentationml/2006/main" type="picTx" preserve="1">
+<p:sldLayout xmlns:a="http://schemas.openxmlformats.org/drawingml/2006/main" xmlns:r="http://schemas.openxmlformats.org/officeDocument/2006/relationships" xmlns:mc="http://schemas.openxmlformats.org/markup-compatibility/2006" xmlns:mv="urn:schemas-microsoft-com:mac:vml" xmlns:p="http://schemas.openxmlformats.org/presentationml/2006/main" mc:Ignorable="mv" mc:PreserveAttributes="mv:*" type="picTx" preserve="1">
   <p:cSld name="Picture with Caption">
     <p:spTree>
       <p:nvGrpSpPr>
@@ -2479,7 +2478,7 @@
             <a:fld id="{1D8BD707-D9CF-40AE-B4C6-C98DA3205C09}" type="datetimeFigureOut">
               <a:rPr lang="en-US" smtClean="0"/>
               <a:pPr/>
-              <a:t>10/19/2011</a:t>
+              <a:t>8/27/12</a:t>
             </a:fld>
             <a:endParaRPr lang="en-US"/>
           </a:p>
@@ -2537,7 +2536,7 @@
 </file>
 
 <file path=ppt/slideMasters/slideMaster1.xml><?xml version="1.0" encoding="utf-8"?>
-<p:sldMaster xmlns:a="http://schemas.openxmlformats.org/drawingml/2006/main" xmlns:r="http://schemas.openxmlformats.org/officeDocument/2006/relationships" xmlns:p="http://schemas.openxmlformats.org/presentationml/2006/main">
+<p:sldMaster xmlns:a="http://schemas.openxmlformats.org/drawingml/2006/main" xmlns:r="http://schemas.openxmlformats.org/officeDocument/2006/relationships" xmlns:mc="http://schemas.openxmlformats.org/markup-compatibility/2006" xmlns:mv="urn:schemas-microsoft-com:mac:vml" xmlns:p="http://schemas.openxmlformats.org/presentationml/2006/main" mc:Ignorable="mv" mc:PreserveAttributes="mv:*">
   <p:cSld>
     <p:bg>
       <p:bgRef idx="1001">
@@ -2689,7 +2688,7 @@
             <a:fld id="{1D8BD707-D9CF-40AE-B4C6-C98DA3205C09}" type="datetimeFigureOut">
               <a:rPr lang="en-US" smtClean="0"/>
               <a:pPr/>
-              <a:t>10/19/2011</a:t>
+              <a:t>8/27/12</a:t>
             </a:fld>
             <a:endParaRPr lang="en-US"/>
           </a:p>
@@ -3044,7 +3043,7 @@
 </file>
 
 <file path=ppt/slides/slide1.xml><?xml version="1.0" encoding="utf-8"?>
-<p:sld xmlns:a="http://schemas.openxmlformats.org/drawingml/2006/main" xmlns:r="http://schemas.openxmlformats.org/officeDocument/2006/relationships" xmlns:p="http://schemas.openxmlformats.org/presentationml/2006/main">
+<p:sld xmlns:a="http://schemas.openxmlformats.org/drawingml/2006/main" xmlns:r="http://schemas.openxmlformats.org/officeDocument/2006/relationships" xmlns:mc="http://schemas.openxmlformats.org/markup-compatibility/2006" xmlns:mv="urn:schemas-microsoft-com:mac:vml" xmlns:p="http://schemas.openxmlformats.org/presentationml/2006/main" mc:Ignorable="mv" mc:PreserveAttributes="mv:*">
   <p:cSld>
     <p:spTree>
       <p:nvGrpSpPr>
@@ -3060,1720 +3059,25 @@
           <a:chExt cx="0" cy="0"/>
         </a:xfrm>
       </p:grpSpPr>
-      <p:grpSp>
-        <p:nvGrpSpPr>
-          <p:cNvPr id="2" name="Group 1"/>
-          <p:cNvGrpSpPr/>
-          <p:nvPr/>
-        </p:nvGrpSpPr>
-        <p:grpSpPr>
-          <a:xfrm>
-            <a:off x="609600" y="381000"/>
-            <a:ext cx="8001000" cy="4824762"/>
-            <a:chOff x="609600" y="381000"/>
-            <a:chExt cx="8001000" cy="4824762"/>
-          </a:xfrm>
-        </p:grpSpPr>
-        <p:sp>
-          <p:nvSpPr>
-            <p:cNvPr id="5" name="Rectangle 4"/>
-            <p:cNvSpPr/>
-            <p:nvPr/>
-          </p:nvSpPr>
-          <p:spPr>
-            <a:xfrm>
-              <a:off x="609600" y="2667000"/>
-              <a:ext cx="609600" cy="533400"/>
-            </a:xfrm>
-            <a:prstGeom prst="rect">
-              <a:avLst/>
-            </a:prstGeom>
-            <a:solidFill>
-              <a:schemeClr val="accent5">
-                <a:lumMod val="40000"/>
-                <a:lumOff val="60000"/>
-              </a:schemeClr>
-            </a:solidFill>
-          </p:spPr>
-          <p:style>
-            <a:lnRef idx="2">
-              <a:schemeClr val="accent1">
-                <a:shade val="50000"/>
-              </a:schemeClr>
-            </a:lnRef>
-            <a:fillRef idx="1">
-              <a:schemeClr val="accent1"/>
-            </a:fillRef>
-            <a:effectRef idx="0">
-              <a:schemeClr val="accent1"/>
-            </a:effectRef>
-            <a:fontRef idx="minor">
-              <a:schemeClr val="lt1"/>
-            </a:fontRef>
-          </p:style>
-          <p:txBody>
-            <a:bodyPr rtlCol="0" anchor="ctr"/>
-            <a:lstStyle/>
-            <a:p>
-              <a:pPr algn="ctr"/>
-              <a:r>
-                <a:rPr lang="en-US" sz="1000" b="1" dirty="0" smtClean="0">
-                  <a:solidFill>
-                    <a:schemeClr val="tx1">
-                      <a:lumMod val="95000"/>
-                      <a:lumOff val="5000"/>
-                    </a:schemeClr>
-                  </a:solidFill>
-                </a:rPr>
-                <a:t>Prompt for unload</a:t>
-              </a:r>
-            </a:p>
-          </p:txBody>
-        </p:sp>
-        <p:sp>
-          <p:nvSpPr>
-            <p:cNvPr id="6" name="Rectangle 5"/>
-            <p:cNvSpPr/>
-            <p:nvPr/>
-          </p:nvSpPr>
-          <p:spPr>
-            <a:xfrm>
-              <a:off x="1295400" y="2668858"/>
-              <a:ext cx="503664" cy="533400"/>
-            </a:xfrm>
-            <a:prstGeom prst="rect">
-              <a:avLst/>
-            </a:prstGeom>
-            <a:solidFill>
-              <a:schemeClr val="accent5">
-                <a:lumMod val="40000"/>
-                <a:lumOff val="60000"/>
-              </a:schemeClr>
-            </a:solidFill>
-          </p:spPr>
-          <p:style>
-            <a:lnRef idx="2">
-              <a:schemeClr val="accent1">
-                <a:shade val="50000"/>
-              </a:schemeClr>
-            </a:lnRef>
-            <a:fillRef idx="1">
-              <a:schemeClr val="accent1"/>
-            </a:fillRef>
-            <a:effectRef idx="0">
-              <a:schemeClr val="accent1"/>
-            </a:effectRef>
-            <a:fontRef idx="minor">
-              <a:schemeClr val="lt1"/>
-            </a:fontRef>
-          </p:style>
-          <p:txBody>
-            <a:bodyPr rtlCol="0" anchor="ctr"/>
-            <a:lstStyle/>
-            <a:p>
-              <a:pPr algn="ctr"/>
-              <a:r>
-                <a:rPr lang="en-US" sz="1000" b="1" dirty="0" smtClean="0">
-                  <a:solidFill>
-                    <a:schemeClr val="tx1">
-                      <a:lumMod val="95000"/>
-                      <a:lumOff val="5000"/>
-                    </a:schemeClr>
-                  </a:solidFill>
-                </a:rPr>
-                <a:t>App cache</a:t>
-              </a:r>
-              <a:endParaRPr lang="en-US" sz="1000" b="1" dirty="0">
-                <a:solidFill>
-                  <a:schemeClr val="tx1">
-                    <a:lumMod val="95000"/>
-                    <a:lumOff val="5000"/>
-                  </a:schemeClr>
-                </a:solidFill>
-              </a:endParaRPr>
-            </a:p>
-          </p:txBody>
-        </p:sp>
-        <p:sp>
-          <p:nvSpPr>
-            <p:cNvPr id="7" name="Rectangle 6"/>
-            <p:cNvSpPr/>
-            <p:nvPr/>
-          </p:nvSpPr>
-          <p:spPr>
-            <a:xfrm>
-              <a:off x="1858536" y="2667000"/>
-              <a:ext cx="457200" cy="533400"/>
-            </a:xfrm>
-            <a:prstGeom prst="rect">
-              <a:avLst/>
-            </a:prstGeom>
-            <a:solidFill>
-              <a:schemeClr val="accent5">
-                <a:lumMod val="40000"/>
-                <a:lumOff val="60000"/>
-              </a:schemeClr>
-            </a:solidFill>
-          </p:spPr>
-          <p:style>
-            <a:lnRef idx="2">
-              <a:schemeClr val="accent1">
-                <a:shade val="50000"/>
-              </a:schemeClr>
-            </a:lnRef>
-            <a:fillRef idx="1">
-              <a:schemeClr val="accent1"/>
-            </a:fillRef>
-            <a:effectRef idx="0">
-              <a:schemeClr val="accent1"/>
-            </a:effectRef>
-            <a:fontRef idx="minor">
-              <a:schemeClr val="lt1"/>
-            </a:fontRef>
-          </p:style>
-          <p:txBody>
-            <a:bodyPr rtlCol="0" anchor="ctr"/>
-            <a:lstStyle/>
-            <a:p>
-              <a:pPr algn="ctr"/>
-              <a:r>
-                <a:rPr lang="en-US" sz="1000" b="1" dirty="0" smtClean="0">
-                  <a:solidFill>
-                    <a:schemeClr val="tx1">
-                      <a:lumMod val="95000"/>
-                      <a:lumOff val="5000"/>
-                    </a:schemeClr>
-                  </a:solidFill>
-                </a:rPr>
-                <a:t>DNS</a:t>
-              </a:r>
-              <a:endParaRPr lang="en-US" sz="1000" b="1" dirty="0">
-                <a:solidFill>
-                  <a:schemeClr val="tx1">
-                    <a:lumMod val="95000"/>
-                    <a:lumOff val="5000"/>
-                  </a:schemeClr>
-                </a:solidFill>
-              </a:endParaRPr>
-            </a:p>
-          </p:txBody>
-        </p:sp>
-        <p:sp>
-          <p:nvSpPr>
-            <p:cNvPr id="8" name="Rectangle 7"/>
-            <p:cNvSpPr/>
-            <p:nvPr/>
-          </p:nvSpPr>
-          <p:spPr>
-            <a:xfrm>
-              <a:off x="2362200" y="2667000"/>
-              <a:ext cx="457200" cy="533400"/>
-            </a:xfrm>
-            <a:prstGeom prst="rect">
-              <a:avLst/>
-            </a:prstGeom>
-            <a:solidFill>
-              <a:schemeClr val="accent5">
-                <a:lumMod val="40000"/>
-                <a:lumOff val="60000"/>
-              </a:schemeClr>
-            </a:solidFill>
-          </p:spPr>
-          <p:style>
-            <a:lnRef idx="2">
-              <a:schemeClr val="accent1">
-                <a:shade val="50000"/>
-              </a:schemeClr>
-            </a:lnRef>
-            <a:fillRef idx="1">
-              <a:schemeClr val="accent1"/>
-            </a:fillRef>
-            <a:effectRef idx="0">
-              <a:schemeClr val="accent1"/>
-            </a:effectRef>
-            <a:fontRef idx="minor">
-              <a:schemeClr val="lt1"/>
-            </a:fontRef>
-          </p:style>
-          <p:txBody>
-            <a:bodyPr rtlCol="0" anchor="ctr"/>
-            <a:lstStyle/>
-            <a:p>
-              <a:pPr algn="ctr"/>
-              <a:r>
-                <a:rPr lang="en-US" sz="1000" b="1" dirty="0" smtClean="0">
-                  <a:solidFill>
-                    <a:schemeClr val="tx1">
-                      <a:lumMod val="95000"/>
-                      <a:lumOff val="5000"/>
-                    </a:schemeClr>
-                  </a:solidFill>
-                </a:rPr>
-                <a:t>TCP</a:t>
-              </a:r>
-              <a:endParaRPr lang="en-US" sz="1000" b="1" dirty="0">
-                <a:solidFill>
-                  <a:schemeClr val="tx1">
-                    <a:lumMod val="95000"/>
-                    <a:lumOff val="5000"/>
-                  </a:schemeClr>
-                </a:solidFill>
-              </a:endParaRPr>
-            </a:p>
-          </p:txBody>
-        </p:sp>
-        <p:sp>
-          <p:nvSpPr>
-            <p:cNvPr id="9" name="Rectangle 8"/>
-            <p:cNvSpPr/>
-            <p:nvPr/>
-          </p:nvSpPr>
-          <p:spPr>
-            <a:xfrm>
-              <a:off x="2895600" y="2667000"/>
-              <a:ext cx="1066800" cy="533400"/>
-            </a:xfrm>
-            <a:prstGeom prst="rect">
-              <a:avLst/>
-            </a:prstGeom>
-            <a:solidFill>
-              <a:schemeClr val="accent5">
-                <a:lumMod val="40000"/>
-                <a:lumOff val="60000"/>
-              </a:schemeClr>
-            </a:solidFill>
-          </p:spPr>
-          <p:style>
-            <a:lnRef idx="2">
-              <a:schemeClr val="accent1">
-                <a:shade val="50000"/>
-              </a:schemeClr>
-            </a:lnRef>
-            <a:fillRef idx="1">
-              <a:schemeClr val="accent1"/>
-            </a:fillRef>
-            <a:effectRef idx="0">
-              <a:schemeClr val="accent1"/>
-            </a:effectRef>
-            <a:fontRef idx="minor">
-              <a:schemeClr val="lt1"/>
-            </a:fontRef>
-          </p:style>
-          <p:txBody>
-            <a:bodyPr rtlCol="0" anchor="ctr"/>
-            <a:lstStyle/>
-            <a:p>
-              <a:pPr algn="ctr"/>
-              <a:r>
-                <a:rPr lang="en-US" sz="1000" b="1" dirty="0" smtClean="0">
-                  <a:solidFill>
-                    <a:schemeClr val="tx1">
-                      <a:lumMod val="95000"/>
-                      <a:lumOff val="5000"/>
-                    </a:schemeClr>
-                  </a:solidFill>
-                </a:rPr>
-                <a:t>Request</a:t>
-              </a:r>
-              <a:endParaRPr lang="en-US" sz="1000" b="1" dirty="0">
-                <a:solidFill>
-                  <a:schemeClr val="tx1">
-                    <a:lumMod val="95000"/>
-                    <a:lumOff val="5000"/>
-                  </a:schemeClr>
-                </a:solidFill>
-              </a:endParaRPr>
-            </a:p>
-          </p:txBody>
-        </p:sp>
-        <p:sp>
-          <p:nvSpPr>
-            <p:cNvPr id="10" name="Rectangle 9"/>
-            <p:cNvSpPr/>
-            <p:nvPr/>
-          </p:nvSpPr>
-          <p:spPr>
-            <a:xfrm>
-              <a:off x="3962400" y="2667000"/>
-              <a:ext cx="1066800" cy="533400"/>
-            </a:xfrm>
-            <a:prstGeom prst="rect">
-              <a:avLst/>
-            </a:prstGeom>
-            <a:solidFill>
-              <a:schemeClr val="accent5">
-                <a:lumMod val="40000"/>
-                <a:lumOff val="60000"/>
-              </a:schemeClr>
-            </a:solidFill>
-          </p:spPr>
-          <p:style>
-            <a:lnRef idx="2">
-              <a:schemeClr val="accent1">
-                <a:shade val="50000"/>
-              </a:schemeClr>
-            </a:lnRef>
-            <a:fillRef idx="1">
-              <a:schemeClr val="accent1"/>
-            </a:fillRef>
-            <a:effectRef idx="0">
-              <a:schemeClr val="accent1"/>
-            </a:effectRef>
-            <a:fontRef idx="minor">
-              <a:schemeClr val="lt1"/>
-            </a:fontRef>
-          </p:style>
-          <p:txBody>
-            <a:bodyPr rtlCol="0" anchor="ctr"/>
-            <a:lstStyle/>
-            <a:p>
-              <a:pPr algn="ctr"/>
-              <a:r>
-                <a:rPr lang="en-US" sz="1000" b="1" dirty="0" smtClean="0">
-                  <a:solidFill>
-                    <a:schemeClr val="tx1">
-                      <a:lumMod val="95000"/>
-                      <a:lumOff val="5000"/>
-                    </a:schemeClr>
-                  </a:solidFill>
-                </a:rPr>
-                <a:t>Response</a:t>
-              </a:r>
-              <a:endParaRPr lang="en-US" sz="1000" b="1" dirty="0">
-                <a:solidFill>
-                  <a:schemeClr val="tx1">
-                    <a:lumMod val="95000"/>
-                    <a:lumOff val="5000"/>
-                  </a:schemeClr>
-                </a:solidFill>
-              </a:endParaRPr>
-            </a:p>
-          </p:txBody>
-        </p:sp>
-        <p:sp>
-          <p:nvSpPr>
-            <p:cNvPr id="11" name="Rectangle 10"/>
-            <p:cNvSpPr/>
-            <p:nvPr/>
-          </p:nvSpPr>
-          <p:spPr>
-            <a:xfrm>
-              <a:off x="6858000" y="2667000"/>
-              <a:ext cx="762000" cy="533400"/>
-            </a:xfrm>
-            <a:prstGeom prst="rect">
-              <a:avLst/>
-            </a:prstGeom>
-            <a:solidFill>
-              <a:schemeClr val="accent5">
-                <a:lumMod val="40000"/>
-                <a:lumOff val="60000"/>
-              </a:schemeClr>
-            </a:solidFill>
-          </p:spPr>
-          <p:style>
-            <a:lnRef idx="2">
-              <a:schemeClr val="accent1">
-                <a:shade val="50000"/>
-              </a:schemeClr>
-            </a:lnRef>
-            <a:fillRef idx="1">
-              <a:schemeClr val="accent1"/>
-            </a:fillRef>
-            <a:effectRef idx="0">
-              <a:schemeClr val="accent1"/>
-            </a:effectRef>
-            <a:fontRef idx="minor">
-              <a:schemeClr val="lt1"/>
-            </a:fontRef>
-          </p:style>
-          <p:txBody>
-            <a:bodyPr rtlCol="0" anchor="ctr"/>
-            <a:lstStyle/>
-            <a:p>
-              <a:pPr algn="ctr"/>
-              <a:r>
-                <a:rPr lang="en-US" sz="1000" b="1" dirty="0" err="1" smtClean="0">
-                  <a:solidFill>
-                    <a:schemeClr val="tx1">
-                      <a:lumMod val="95000"/>
-                      <a:lumOff val="5000"/>
-                    </a:schemeClr>
-                  </a:solidFill>
-                </a:rPr>
-                <a:t>onLoad</a:t>
-              </a:r>
-              <a:endParaRPr lang="en-US" sz="1000" b="1" dirty="0">
-                <a:solidFill>
-                  <a:schemeClr val="tx1">
-                    <a:lumMod val="95000"/>
-                    <a:lumOff val="5000"/>
-                  </a:schemeClr>
-                </a:solidFill>
-              </a:endParaRPr>
-            </a:p>
-          </p:txBody>
-        </p:sp>
-        <p:sp>
-          <p:nvSpPr>
-            <p:cNvPr id="12" name="Rectangle 11"/>
-            <p:cNvSpPr/>
-            <p:nvPr/>
-          </p:nvSpPr>
-          <p:spPr>
-            <a:xfrm>
-              <a:off x="5105400" y="2667000"/>
-              <a:ext cx="1761893" cy="533400"/>
-            </a:xfrm>
-            <a:prstGeom prst="rect">
-              <a:avLst/>
-            </a:prstGeom>
-            <a:solidFill>
-              <a:schemeClr val="accent5">
-                <a:lumMod val="40000"/>
-                <a:lumOff val="60000"/>
-              </a:schemeClr>
-            </a:solidFill>
-          </p:spPr>
-          <p:style>
-            <a:lnRef idx="2">
-              <a:schemeClr val="accent1">
-                <a:shade val="50000"/>
-              </a:schemeClr>
-            </a:lnRef>
-            <a:fillRef idx="1">
-              <a:schemeClr val="accent1"/>
-            </a:fillRef>
-            <a:effectRef idx="0">
-              <a:schemeClr val="accent1"/>
-            </a:effectRef>
-            <a:fontRef idx="minor">
-              <a:schemeClr val="lt1"/>
-            </a:fontRef>
-          </p:style>
-          <p:txBody>
-            <a:bodyPr rtlCol="0" anchor="ctr"/>
-            <a:lstStyle/>
-            <a:p>
-              <a:pPr algn="ctr"/>
-              <a:r>
-                <a:rPr lang="en-US" sz="1000" b="1" dirty="0" smtClean="0">
-                  <a:solidFill>
-                    <a:schemeClr val="tx1">
-                      <a:lumMod val="95000"/>
-                      <a:lumOff val="5000"/>
-                    </a:schemeClr>
-                  </a:solidFill>
-                </a:rPr>
-                <a:t>Processing</a:t>
-              </a:r>
-            </a:p>
-          </p:txBody>
-        </p:sp>
-        <p:sp>
-          <p:nvSpPr>
-            <p:cNvPr id="4" name="Rectangle 3"/>
-            <p:cNvSpPr/>
-            <p:nvPr/>
-          </p:nvSpPr>
-          <p:spPr>
-            <a:xfrm>
-              <a:off x="3810000" y="3124200"/>
-              <a:ext cx="685800" cy="533400"/>
-            </a:xfrm>
-            <a:prstGeom prst="rect">
-              <a:avLst/>
-            </a:prstGeom>
-            <a:solidFill>
-              <a:schemeClr val="accent5">
-                <a:lumMod val="40000"/>
-                <a:lumOff val="60000"/>
-              </a:schemeClr>
-            </a:solidFill>
-          </p:spPr>
-          <p:style>
-            <a:lnRef idx="2">
-              <a:schemeClr val="accent1">
-                <a:shade val="50000"/>
-              </a:schemeClr>
-            </a:lnRef>
-            <a:fillRef idx="1">
-              <a:schemeClr val="accent1"/>
-            </a:fillRef>
-            <a:effectRef idx="0">
-              <a:schemeClr val="accent1"/>
-            </a:effectRef>
-            <a:fontRef idx="minor">
-              <a:schemeClr val="lt1"/>
-            </a:fontRef>
-          </p:style>
-          <p:txBody>
-            <a:bodyPr rtlCol="0" anchor="ctr"/>
-            <a:lstStyle/>
-            <a:p>
-              <a:pPr algn="ctr"/>
-              <a:r>
-                <a:rPr lang="en-US" sz="1000" b="1" dirty="0" smtClean="0">
-                  <a:solidFill>
-                    <a:schemeClr val="tx1">
-                      <a:lumMod val="95000"/>
-                      <a:lumOff val="5000"/>
-                    </a:schemeClr>
-                  </a:solidFill>
-                </a:rPr>
-                <a:t>unload</a:t>
-              </a:r>
-              <a:endParaRPr lang="en-US" sz="1000" b="1" dirty="0">
-                <a:solidFill>
-                  <a:schemeClr val="tx1">
-                    <a:lumMod val="95000"/>
-                    <a:lumOff val="5000"/>
-                  </a:schemeClr>
-                </a:solidFill>
-              </a:endParaRPr>
-            </a:p>
-          </p:txBody>
-        </p:sp>
-        <p:sp>
-          <p:nvSpPr>
-            <p:cNvPr id="14" name="Line Callout 2 (No Border) 13"/>
-            <p:cNvSpPr/>
-            <p:nvPr/>
-          </p:nvSpPr>
-          <p:spPr>
-            <a:xfrm>
-              <a:off x="2362200" y="381000"/>
-              <a:ext cx="1066800" cy="202581"/>
-            </a:xfrm>
-            <a:prstGeom prst="callout2">
-              <a:avLst>
-                <a:gd name="adj1" fmla="val 50457"/>
-                <a:gd name="adj2" fmla="val 29"/>
-                <a:gd name="adj3" fmla="val 50457"/>
-                <a:gd name="adj4" fmla="val -52904"/>
-                <a:gd name="adj5" fmla="val 1124433"/>
-                <a:gd name="adj6" fmla="val -108482"/>
-              </a:avLst>
-            </a:prstGeom>
-            <a:solidFill>
-              <a:schemeClr val="bg1"/>
-            </a:solidFill>
-            <a:ln w="15875">
-              <a:tailEnd type="stealth" w="sm" len="med"/>
-            </a:ln>
-          </p:spPr>
-          <p:style>
-            <a:lnRef idx="2">
-              <a:schemeClr val="accent1">
-                <a:shade val="50000"/>
-              </a:schemeClr>
-            </a:lnRef>
-            <a:fillRef idx="1">
-              <a:schemeClr val="accent1"/>
-            </a:fillRef>
-            <a:effectRef idx="0">
-              <a:schemeClr val="accent1"/>
-            </a:effectRef>
-            <a:fontRef idx="minor">
-              <a:schemeClr val="lt1"/>
-            </a:fontRef>
-          </p:style>
-          <p:txBody>
-            <a:bodyPr rtlCol="0" anchor="ctr"/>
-            <a:lstStyle/>
-            <a:p>
-              <a:r>
-                <a:rPr lang="en-US" sz="1050" b="1" dirty="0" err="1" smtClean="0">
-                  <a:solidFill>
-                    <a:schemeClr val="tx1">
-                      <a:lumMod val="95000"/>
-                      <a:lumOff val="5000"/>
-                    </a:schemeClr>
-                  </a:solidFill>
-                </a:rPr>
-                <a:t>navigationStart</a:t>
-              </a:r>
-              <a:endParaRPr lang="en-US" sz="1050" b="1" dirty="0">
-                <a:solidFill>
-                  <a:schemeClr val="tx1">
-                    <a:lumMod val="95000"/>
-                    <a:lumOff val="5000"/>
-                  </a:schemeClr>
-                </a:solidFill>
-              </a:endParaRPr>
-            </a:p>
-          </p:txBody>
-        </p:sp>
-        <p:sp>
-          <p:nvSpPr>
-            <p:cNvPr id="15" name="Line Callout 2 (No Border) 14"/>
-            <p:cNvSpPr/>
-            <p:nvPr/>
-          </p:nvSpPr>
-          <p:spPr>
-            <a:xfrm>
-              <a:off x="2583366" y="587299"/>
-              <a:ext cx="1173480" cy="202581"/>
-            </a:xfrm>
-            <a:prstGeom prst="callout2">
-              <a:avLst>
-                <a:gd name="adj1" fmla="val 50457"/>
-                <a:gd name="adj2" fmla="val -1365"/>
-                <a:gd name="adj3" fmla="val 50457"/>
-                <a:gd name="adj4" fmla="val -52904"/>
-                <a:gd name="adj5" fmla="val 987644"/>
-                <a:gd name="adj6" fmla="val -107164"/>
-              </a:avLst>
-            </a:prstGeom>
-            <a:solidFill>
-              <a:schemeClr val="bg1"/>
-            </a:solidFill>
-            <a:ln w="15875">
-              <a:tailEnd type="stealth" w="sm" len="med"/>
-            </a:ln>
-          </p:spPr>
-          <p:style>
-            <a:lnRef idx="2">
-              <a:schemeClr val="accent1">
-                <a:shade val="50000"/>
-              </a:schemeClr>
-            </a:lnRef>
-            <a:fillRef idx="1">
-              <a:schemeClr val="accent1"/>
-            </a:fillRef>
-            <a:effectRef idx="0">
-              <a:schemeClr val="accent1"/>
-            </a:effectRef>
-            <a:fontRef idx="minor">
-              <a:schemeClr val="lt1"/>
-            </a:fontRef>
-          </p:style>
-          <p:txBody>
-            <a:bodyPr rtlCol="0" anchor="ctr"/>
-            <a:lstStyle/>
-            <a:p>
-              <a:r>
-                <a:rPr lang="en-US" sz="1050" b="1" dirty="0" err="1" smtClean="0">
-                  <a:solidFill>
-                    <a:schemeClr val="tx1">
-                      <a:lumMod val="95000"/>
-                      <a:lumOff val="5000"/>
-                    </a:schemeClr>
-                  </a:solidFill>
-                </a:rPr>
-                <a:t>fetchStart</a:t>
-              </a:r>
-              <a:endParaRPr lang="en-US" sz="1050" b="1" dirty="0">
-                <a:solidFill>
-                  <a:schemeClr val="tx1">
-                    <a:lumMod val="95000"/>
-                    <a:lumOff val="5000"/>
-                  </a:schemeClr>
-                </a:solidFill>
-              </a:endParaRPr>
-            </a:p>
-          </p:txBody>
-        </p:sp>
-        <p:sp>
-          <p:nvSpPr>
-            <p:cNvPr id="16" name="Line Callout 2 (No Border) 15"/>
-            <p:cNvSpPr/>
-            <p:nvPr/>
-          </p:nvSpPr>
-          <p:spPr>
-            <a:xfrm>
-              <a:off x="2972730" y="776872"/>
-              <a:ext cx="1424568" cy="202581"/>
-            </a:xfrm>
-            <a:prstGeom prst="callout2">
-              <a:avLst>
-                <a:gd name="adj1" fmla="val 46787"/>
-                <a:gd name="adj2" fmla="val -1168"/>
-                <a:gd name="adj3" fmla="val 50457"/>
-                <a:gd name="adj4" fmla="val -52904"/>
-                <a:gd name="adj5" fmla="val 941834"/>
-                <a:gd name="adj6" fmla="val -78070"/>
-              </a:avLst>
-            </a:prstGeom>
-            <a:solidFill>
-              <a:schemeClr val="bg1"/>
-            </a:solidFill>
-            <a:ln w="15875">
-              <a:tailEnd type="stealth" w="sm" len="med"/>
-            </a:ln>
-          </p:spPr>
-          <p:style>
-            <a:lnRef idx="2">
-              <a:schemeClr val="accent1">
-                <a:shade val="50000"/>
-              </a:schemeClr>
-            </a:lnRef>
-            <a:fillRef idx="1">
-              <a:schemeClr val="accent1"/>
-            </a:fillRef>
-            <a:effectRef idx="0">
-              <a:schemeClr val="accent1"/>
-            </a:effectRef>
-            <a:fontRef idx="minor">
-              <a:schemeClr val="lt1"/>
-            </a:fontRef>
-          </p:style>
-          <p:txBody>
-            <a:bodyPr rtlCol="0" anchor="ctr"/>
-            <a:lstStyle/>
-            <a:p>
-              <a:r>
-                <a:rPr lang="en-US" sz="1050" b="1" dirty="0" err="1" smtClean="0">
-                  <a:solidFill>
-                    <a:schemeClr val="tx1">
-                      <a:lumMod val="95000"/>
-                      <a:lumOff val="5000"/>
-                    </a:schemeClr>
-                  </a:solidFill>
-                </a:rPr>
-                <a:t>domainLookupStart</a:t>
-              </a:r>
-              <a:endParaRPr lang="en-US" sz="1050" b="1" dirty="0">
-                <a:solidFill>
-                  <a:schemeClr val="tx1">
-                    <a:lumMod val="95000"/>
-                    <a:lumOff val="5000"/>
-                  </a:schemeClr>
-                </a:solidFill>
-              </a:endParaRPr>
-            </a:p>
-          </p:txBody>
-        </p:sp>
-        <p:sp>
-          <p:nvSpPr>
-            <p:cNvPr id="17" name="Line Callout 2 (No Border) 16"/>
-            <p:cNvSpPr/>
-            <p:nvPr/>
-          </p:nvSpPr>
-          <p:spPr>
-            <a:xfrm>
-              <a:off x="3162300" y="962721"/>
-              <a:ext cx="1242432" cy="202581"/>
-            </a:xfrm>
-            <a:prstGeom prst="callout2">
-              <a:avLst>
-                <a:gd name="adj1" fmla="val 50457"/>
-                <a:gd name="adj2" fmla="val 29"/>
-                <a:gd name="adj3" fmla="val 50457"/>
-                <a:gd name="adj4" fmla="val -52904"/>
-                <a:gd name="adj5" fmla="val 828073"/>
-                <a:gd name="adj6" fmla="val -67898"/>
-              </a:avLst>
-            </a:prstGeom>
-            <a:solidFill>
-              <a:schemeClr val="bg1"/>
-            </a:solidFill>
-            <a:ln w="15875">
-              <a:tailEnd type="stealth" w="sm" len="med"/>
-            </a:ln>
-          </p:spPr>
-          <p:style>
-            <a:lnRef idx="2">
-              <a:schemeClr val="accent1">
-                <a:shade val="50000"/>
-              </a:schemeClr>
-            </a:lnRef>
-            <a:fillRef idx="1">
-              <a:schemeClr val="accent1"/>
-            </a:fillRef>
-            <a:effectRef idx="0">
-              <a:schemeClr val="accent1"/>
-            </a:effectRef>
-            <a:fontRef idx="minor">
-              <a:schemeClr val="lt1"/>
-            </a:fontRef>
-          </p:style>
-          <p:txBody>
-            <a:bodyPr rtlCol="0" anchor="ctr"/>
-            <a:lstStyle/>
-            <a:p>
-              <a:r>
-                <a:rPr lang="en-US" sz="1050" b="1" dirty="0" err="1" smtClean="0">
-                  <a:solidFill>
-                    <a:schemeClr val="tx1">
-                      <a:lumMod val="95000"/>
-                      <a:lumOff val="5000"/>
-                    </a:schemeClr>
-                  </a:solidFill>
-                </a:rPr>
-                <a:t>domainLookupEnd</a:t>
-              </a:r>
-              <a:endParaRPr lang="en-US" sz="1050" b="1" dirty="0">
-                <a:solidFill>
-                  <a:schemeClr val="tx1">
-                    <a:lumMod val="95000"/>
-                    <a:lumOff val="5000"/>
-                  </a:schemeClr>
-                </a:solidFill>
-              </a:endParaRPr>
-            </a:p>
-          </p:txBody>
-        </p:sp>
-        <p:sp>
-          <p:nvSpPr>
-            <p:cNvPr id="18" name="Line Callout 2 (No Border) 17"/>
-            <p:cNvSpPr/>
-            <p:nvPr/>
-          </p:nvSpPr>
-          <p:spPr>
-            <a:xfrm>
-              <a:off x="3505200" y="1169019"/>
-              <a:ext cx="1242432" cy="202581"/>
-            </a:xfrm>
-            <a:prstGeom prst="callout2">
-              <a:avLst>
-                <a:gd name="adj1" fmla="val 50457"/>
-                <a:gd name="adj2" fmla="val 29"/>
-                <a:gd name="adj3" fmla="val 50457"/>
-                <a:gd name="adj4" fmla="val -52904"/>
-                <a:gd name="adj5" fmla="val 708948"/>
-                <a:gd name="adj6" fmla="val -89826"/>
-              </a:avLst>
-            </a:prstGeom>
-            <a:solidFill>
-              <a:schemeClr val="bg1"/>
-            </a:solidFill>
-            <a:ln w="15875">
-              <a:tailEnd type="stealth" w="sm" len="med"/>
-            </a:ln>
-          </p:spPr>
-          <p:style>
-            <a:lnRef idx="2">
-              <a:schemeClr val="accent1">
-                <a:shade val="50000"/>
-              </a:schemeClr>
-            </a:lnRef>
-            <a:fillRef idx="1">
-              <a:schemeClr val="accent1"/>
-            </a:fillRef>
-            <a:effectRef idx="0">
-              <a:schemeClr val="accent1"/>
-            </a:effectRef>
-            <a:fontRef idx="minor">
-              <a:schemeClr val="lt1"/>
-            </a:fontRef>
-          </p:style>
-          <p:txBody>
-            <a:bodyPr rtlCol="0" anchor="ctr"/>
-            <a:lstStyle/>
-            <a:p>
-              <a:r>
-                <a:rPr lang="en-US" sz="1050" b="1" dirty="0" err="1" smtClean="0">
-                  <a:solidFill>
-                    <a:schemeClr val="tx1">
-                      <a:lumMod val="95000"/>
-                      <a:lumOff val="5000"/>
-                    </a:schemeClr>
-                  </a:solidFill>
-                </a:rPr>
-                <a:t>connectStart</a:t>
-              </a:r>
-              <a:endParaRPr lang="en-US" sz="1050" b="1" dirty="0">
-                <a:solidFill>
-                  <a:schemeClr val="tx1">
-                    <a:lumMod val="95000"/>
-                    <a:lumOff val="5000"/>
-                  </a:schemeClr>
-                </a:solidFill>
-              </a:endParaRPr>
-            </a:p>
-          </p:txBody>
-        </p:sp>
-        <p:sp>
-          <p:nvSpPr>
-            <p:cNvPr id="19" name="Line Callout 2 (No Border) 18"/>
-            <p:cNvSpPr/>
-            <p:nvPr/>
-          </p:nvSpPr>
-          <p:spPr>
-            <a:xfrm>
-              <a:off x="3765396" y="1371600"/>
-              <a:ext cx="1242432" cy="202581"/>
-            </a:xfrm>
-            <a:prstGeom prst="callout2">
-              <a:avLst>
-                <a:gd name="adj1" fmla="val 50457"/>
-                <a:gd name="adj2" fmla="val 29"/>
-                <a:gd name="adj3" fmla="val 50457"/>
-                <a:gd name="adj4" fmla="val -52904"/>
-                <a:gd name="adj5" fmla="val 626237"/>
-                <a:gd name="adj6" fmla="val -76275"/>
-              </a:avLst>
-            </a:prstGeom>
-            <a:solidFill>
-              <a:schemeClr val="bg1"/>
-            </a:solidFill>
-            <a:ln w="15875">
-              <a:tailEnd type="stealth" w="sm" len="med"/>
-            </a:ln>
-          </p:spPr>
-          <p:style>
-            <a:lnRef idx="2">
-              <a:schemeClr val="accent1">
-                <a:shade val="50000"/>
-              </a:schemeClr>
-            </a:lnRef>
-            <a:fillRef idx="1">
-              <a:schemeClr val="accent1"/>
-            </a:fillRef>
-            <a:effectRef idx="0">
-              <a:schemeClr val="accent1"/>
-            </a:effectRef>
-            <a:fontRef idx="minor">
-              <a:schemeClr val="lt1"/>
-            </a:fontRef>
-          </p:style>
-          <p:txBody>
-            <a:bodyPr rtlCol="0" anchor="ctr"/>
-            <a:lstStyle/>
-            <a:p>
-              <a:r>
-                <a:rPr lang="en-US" sz="1050" b="1" dirty="0" err="1" smtClean="0">
-                  <a:solidFill>
-                    <a:schemeClr val="tx1">
-                      <a:lumMod val="95000"/>
-                      <a:lumOff val="5000"/>
-                    </a:schemeClr>
-                  </a:solidFill>
-                </a:rPr>
-                <a:t>connectEnd</a:t>
-              </a:r>
-              <a:endParaRPr lang="en-US" sz="1050" b="1" dirty="0">
-                <a:solidFill>
-                  <a:schemeClr val="tx1">
-                    <a:lumMod val="95000"/>
-                    <a:lumOff val="5000"/>
-                  </a:schemeClr>
-                </a:solidFill>
-              </a:endParaRPr>
-            </a:p>
-          </p:txBody>
-        </p:sp>
-        <p:sp>
-          <p:nvSpPr>
-            <p:cNvPr id="20" name="Line Callout 2 (No Border) 19"/>
-            <p:cNvSpPr/>
-            <p:nvPr/>
-          </p:nvSpPr>
-          <p:spPr>
-            <a:xfrm>
-              <a:off x="4038600" y="1574181"/>
-              <a:ext cx="1242432" cy="202581"/>
-            </a:xfrm>
-            <a:prstGeom prst="callout2">
-              <a:avLst>
-                <a:gd name="adj1" fmla="val 50457"/>
-                <a:gd name="adj2" fmla="val 29"/>
-                <a:gd name="adj3" fmla="val 50457"/>
-                <a:gd name="adj4" fmla="val -52904"/>
-                <a:gd name="adj5" fmla="val 541834"/>
-                <a:gd name="adj6" fmla="val -91832"/>
-              </a:avLst>
-            </a:prstGeom>
-            <a:solidFill>
-              <a:schemeClr val="bg1"/>
-            </a:solidFill>
-            <a:ln w="15875">
-              <a:tailEnd type="stealth" w="sm" len="med"/>
-            </a:ln>
-          </p:spPr>
-          <p:style>
-            <a:lnRef idx="2">
-              <a:schemeClr val="accent1">
-                <a:shade val="50000"/>
-              </a:schemeClr>
-            </a:lnRef>
-            <a:fillRef idx="1">
-              <a:schemeClr val="accent1"/>
-            </a:fillRef>
-            <a:effectRef idx="0">
-              <a:schemeClr val="accent1"/>
-            </a:effectRef>
-            <a:fontRef idx="minor">
-              <a:schemeClr val="lt1"/>
-            </a:fontRef>
-          </p:style>
-          <p:txBody>
-            <a:bodyPr rtlCol="0" anchor="ctr"/>
-            <a:lstStyle/>
-            <a:p>
-              <a:r>
-                <a:rPr lang="en-US" sz="1050" b="1" dirty="0" err="1" smtClean="0">
-                  <a:solidFill>
-                    <a:schemeClr val="tx1">
-                      <a:lumMod val="95000"/>
-                      <a:lumOff val="5000"/>
-                    </a:schemeClr>
-                  </a:solidFill>
-                </a:rPr>
-                <a:t>requestStart</a:t>
-              </a:r>
-              <a:endParaRPr lang="en-US" sz="1050" b="1" dirty="0">
-                <a:solidFill>
-                  <a:schemeClr val="tx1">
-                    <a:lumMod val="95000"/>
-                    <a:lumOff val="5000"/>
-                  </a:schemeClr>
-                </a:solidFill>
-              </a:endParaRPr>
-            </a:p>
-          </p:txBody>
-        </p:sp>
-        <p:sp>
-          <p:nvSpPr>
-            <p:cNvPr id="22" name="Line Callout 2 (No Border) 21"/>
-            <p:cNvSpPr/>
-            <p:nvPr/>
-          </p:nvSpPr>
-          <p:spPr>
-            <a:xfrm>
-              <a:off x="4611030" y="1984917"/>
-              <a:ext cx="1242432" cy="202581"/>
-            </a:xfrm>
-            <a:prstGeom prst="callout2">
-              <a:avLst>
-                <a:gd name="adj1" fmla="val 50457"/>
-                <a:gd name="adj2" fmla="val 29"/>
-                <a:gd name="adj3" fmla="val 46787"/>
-                <a:gd name="adj4" fmla="val -38544"/>
-                <a:gd name="adj5" fmla="val 328990"/>
-                <a:gd name="adj6" fmla="val -51742"/>
-              </a:avLst>
-            </a:prstGeom>
-            <a:solidFill>
-              <a:schemeClr val="bg1"/>
-            </a:solidFill>
-            <a:ln w="15875">
-              <a:tailEnd type="stealth" w="sm" len="med"/>
-            </a:ln>
-          </p:spPr>
-          <p:style>
-            <a:lnRef idx="2">
-              <a:schemeClr val="accent1">
-                <a:shade val="50000"/>
-              </a:schemeClr>
-            </a:lnRef>
-            <a:fillRef idx="1">
-              <a:schemeClr val="accent1"/>
-            </a:fillRef>
-            <a:effectRef idx="0">
-              <a:schemeClr val="accent1"/>
-            </a:effectRef>
-            <a:fontRef idx="minor">
-              <a:schemeClr val="lt1"/>
-            </a:fontRef>
-          </p:style>
-          <p:txBody>
-            <a:bodyPr rtlCol="0" anchor="ctr"/>
-            <a:lstStyle/>
-            <a:p>
-              <a:r>
-                <a:rPr lang="en-US" sz="1050" b="1" dirty="0" err="1" smtClean="0">
-                  <a:solidFill>
-                    <a:schemeClr val="tx1">
-                      <a:lumMod val="95000"/>
-                      <a:lumOff val="5000"/>
-                    </a:schemeClr>
-                  </a:solidFill>
-                </a:rPr>
-                <a:t>responseStart</a:t>
-              </a:r>
-              <a:endParaRPr lang="en-US" sz="1050" b="1" dirty="0">
-                <a:solidFill>
-                  <a:schemeClr val="tx1">
-                    <a:lumMod val="95000"/>
-                    <a:lumOff val="5000"/>
-                  </a:schemeClr>
-                </a:solidFill>
-              </a:endParaRPr>
-            </a:p>
-          </p:txBody>
-        </p:sp>
-        <p:sp>
-          <p:nvSpPr>
-            <p:cNvPr id="23" name="Line Callout 2 (No Border) 22"/>
-            <p:cNvSpPr/>
-            <p:nvPr/>
-          </p:nvSpPr>
-          <p:spPr>
-            <a:xfrm>
-              <a:off x="5105400" y="2194932"/>
-              <a:ext cx="1242432" cy="202581"/>
-            </a:xfrm>
-            <a:prstGeom prst="callout2">
-              <a:avLst>
-                <a:gd name="adj1" fmla="val 50457"/>
-                <a:gd name="adj2" fmla="val 29"/>
-                <a:gd name="adj3" fmla="val 46787"/>
-                <a:gd name="adj4" fmla="val -847"/>
-                <a:gd name="adj5" fmla="val 229909"/>
-                <a:gd name="adj6" fmla="val -6866"/>
-              </a:avLst>
-            </a:prstGeom>
-            <a:solidFill>
-              <a:schemeClr val="bg1"/>
-            </a:solidFill>
-            <a:ln w="15875">
-              <a:tailEnd type="stealth" w="sm" len="med"/>
-            </a:ln>
-          </p:spPr>
-          <p:style>
-            <a:lnRef idx="2">
-              <a:schemeClr val="accent1">
-                <a:shade val="50000"/>
-              </a:schemeClr>
-            </a:lnRef>
-            <a:fillRef idx="1">
-              <a:schemeClr val="accent1"/>
-            </a:fillRef>
-            <a:effectRef idx="0">
-              <a:schemeClr val="accent1"/>
-            </a:effectRef>
-            <a:fontRef idx="minor">
-              <a:schemeClr val="lt1"/>
-            </a:fontRef>
-          </p:style>
-          <p:txBody>
-            <a:bodyPr rtlCol="0" anchor="ctr"/>
-            <a:lstStyle/>
-            <a:p>
-              <a:r>
-                <a:rPr lang="en-US" sz="1050" b="1" dirty="0" err="1" smtClean="0">
-                  <a:solidFill>
-                    <a:schemeClr val="tx1">
-                      <a:lumMod val="95000"/>
-                      <a:lumOff val="5000"/>
-                    </a:schemeClr>
-                  </a:solidFill>
-                </a:rPr>
-                <a:t>responseEnd</a:t>
-              </a:r>
-              <a:endParaRPr lang="en-US" sz="1050" b="1" dirty="0">
-                <a:solidFill>
-                  <a:schemeClr val="tx1">
-                    <a:lumMod val="95000"/>
-                    <a:lumOff val="5000"/>
-                  </a:schemeClr>
-                </a:solidFill>
-              </a:endParaRPr>
-            </a:p>
-          </p:txBody>
-        </p:sp>
-        <p:sp>
-          <p:nvSpPr>
-            <p:cNvPr id="24" name="Line Callout 2 (No Border) 23"/>
-            <p:cNvSpPr/>
-            <p:nvPr/>
-          </p:nvSpPr>
-          <p:spPr>
-            <a:xfrm>
-              <a:off x="5691768" y="5003181"/>
-              <a:ext cx="1242432" cy="202581"/>
-            </a:xfrm>
-            <a:prstGeom prst="callout2">
-              <a:avLst>
-                <a:gd name="adj1" fmla="val 50457"/>
-                <a:gd name="adj2" fmla="val 29"/>
-                <a:gd name="adj3" fmla="val 46787"/>
-                <a:gd name="adj4" fmla="val -38544"/>
-                <a:gd name="adj5" fmla="val -661834"/>
-                <a:gd name="adj6" fmla="val -151069"/>
-              </a:avLst>
-            </a:prstGeom>
-            <a:solidFill>
-              <a:schemeClr val="bg1"/>
-            </a:solidFill>
-            <a:ln w="15875">
-              <a:tailEnd type="stealth" w="sm" len="med"/>
-            </a:ln>
-          </p:spPr>
-          <p:style>
-            <a:lnRef idx="2">
-              <a:schemeClr val="accent1">
-                <a:shade val="50000"/>
-              </a:schemeClr>
-            </a:lnRef>
-            <a:fillRef idx="1">
-              <a:schemeClr val="accent1"/>
-            </a:fillRef>
-            <a:effectRef idx="0">
-              <a:schemeClr val="accent1"/>
-            </a:effectRef>
-            <a:fontRef idx="minor">
-              <a:schemeClr val="lt1"/>
-            </a:fontRef>
-          </p:style>
-          <p:txBody>
-            <a:bodyPr rtlCol="0" anchor="ctr"/>
-            <a:lstStyle/>
-            <a:p>
-              <a:r>
-                <a:rPr lang="en-US" sz="1050" b="1" u="sng" dirty="0" err="1" smtClean="0">
-                  <a:solidFill>
-                    <a:schemeClr val="tx1">
-                      <a:lumMod val="95000"/>
-                      <a:lumOff val="5000"/>
-                    </a:schemeClr>
-                  </a:solidFill>
-                </a:rPr>
-                <a:t>unloadStart</a:t>
-              </a:r>
-              <a:endParaRPr lang="en-US" sz="1050" b="1" u="sng" dirty="0">
-                <a:solidFill>
-                  <a:schemeClr val="tx1">
-                    <a:lumMod val="95000"/>
-                    <a:lumOff val="5000"/>
-                  </a:schemeClr>
-                </a:solidFill>
-              </a:endParaRPr>
-            </a:p>
-          </p:txBody>
-        </p:sp>
-        <p:sp>
-          <p:nvSpPr>
-            <p:cNvPr id="26" name="Line Callout 2 (No Border) 25"/>
-            <p:cNvSpPr/>
-            <p:nvPr/>
-          </p:nvSpPr>
-          <p:spPr>
-            <a:xfrm>
-              <a:off x="5906430" y="4770864"/>
-              <a:ext cx="1242432" cy="202581"/>
-            </a:xfrm>
-            <a:prstGeom prst="callout2">
-              <a:avLst>
-                <a:gd name="adj1" fmla="val 50457"/>
-                <a:gd name="adj2" fmla="val 29"/>
-                <a:gd name="adj3" fmla="val 46787"/>
-                <a:gd name="adj4" fmla="val -38544"/>
-                <a:gd name="adj5" fmla="val -551743"/>
-                <a:gd name="adj6" fmla="val -113373"/>
-              </a:avLst>
-            </a:prstGeom>
-            <a:solidFill>
-              <a:schemeClr val="bg1"/>
-            </a:solidFill>
-            <a:ln w="15875">
-              <a:tailEnd type="stealth" w="sm" len="med"/>
-            </a:ln>
-          </p:spPr>
-          <p:style>
-            <a:lnRef idx="2">
-              <a:schemeClr val="accent1">
-                <a:shade val="50000"/>
-              </a:schemeClr>
-            </a:lnRef>
-            <a:fillRef idx="1">
-              <a:schemeClr val="accent1"/>
-            </a:fillRef>
-            <a:effectRef idx="0">
-              <a:schemeClr val="accent1"/>
-            </a:effectRef>
-            <a:fontRef idx="minor">
-              <a:schemeClr val="lt1"/>
-            </a:fontRef>
-          </p:style>
-          <p:txBody>
-            <a:bodyPr rtlCol="0" anchor="ctr"/>
-            <a:lstStyle/>
-            <a:p>
-              <a:r>
-                <a:rPr lang="en-US" sz="1050" b="1" u="sng" dirty="0" err="1" smtClean="0">
-                  <a:solidFill>
-                    <a:schemeClr val="tx1">
-                      <a:lumMod val="95000"/>
-                      <a:lumOff val="5000"/>
-                    </a:schemeClr>
-                  </a:solidFill>
-                </a:rPr>
-                <a:t>unloadEnd</a:t>
-              </a:r>
-              <a:endParaRPr lang="en-US" sz="1050" b="1" u="sng" dirty="0">
-                <a:solidFill>
-                  <a:schemeClr val="tx1">
-                    <a:lumMod val="95000"/>
-                    <a:lumOff val="5000"/>
-                  </a:schemeClr>
-                </a:solidFill>
-              </a:endParaRPr>
-            </a:p>
-          </p:txBody>
-        </p:sp>
-        <p:sp>
-          <p:nvSpPr>
-            <p:cNvPr id="27" name="Line Callout 2 (No Border) 26"/>
-            <p:cNvSpPr/>
-            <p:nvPr/>
-          </p:nvSpPr>
-          <p:spPr>
-            <a:xfrm>
-              <a:off x="6262224" y="4572000"/>
-              <a:ext cx="1242432" cy="202581"/>
-            </a:xfrm>
-            <a:prstGeom prst="callout2">
-              <a:avLst>
-                <a:gd name="adj1" fmla="val 50457"/>
-                <a:gd name="adj2" fmla="val 29"/>
-                <a:gd name="adj3" fmla="val 46787"/>
-                <a:gd name="adj4" fmla="val -38544"/>
-                <a:gd name="adj5" fmla="val -672843"/>
-                <a:gd name="adj6" fmla="val -91233"/>
-              </a:avLst>
-            </a:prstGeom>
-            <a:solidFill>
-              <a:schemeClr val="bg1"/>
-            </a:solidFill>
-            <a:ln w="15875">
-              <a:tailEnd type="stealth" w="sm" len="med"/>
-            </a:ln>
-          </p:spPr>
-          <p:style>
-            <a:lnRef idx="2">
-              <a:schemeClr val="accent1">
-                <a:shade val="50000"/>
-              </a:schemeClr>
-            </a:lnRef>
-            <a:fillRef idx="1">
-              <a:schemeClr val="accent1"/>
-            </a:fillRef>
-            <a:effectRef idx="0">
-              <a:schemeClr val="accent1"/>
-            </a:effectRef>
-            <a:fontRef idx="minor">
-              <a:schemeClr val="lt1"/>
-            </a:fontRef>
-          </p:style>
-          <p:txBody>
-            <a:bodyPr rtlCol="0" anchor="ctr"/>
-            <a:lstStyle/>
-            <a:p>
-              <a:r>
-                <a:rPr lang="en-US" sz="1050" b="1" dirty="0" err="1" smtClean="0">
-                  <a:solidFill>
-                    <a:schemeClr val="tx1">
-                      <a:lumMod val="95000"/>
-                      <a:lumOff val="5000"/>
-                    </a:schemeClr>
-                  </a:solidFill>
-                </a:rPr>
-                <a:t>domLoading</a:t>
-              </a:r>
-              <a:endParaRPr lang="en-US" sz="1050" b="1" dirty="0">
-                <a:solidFill>
-                  <a:schemeClr val="tx1">
-                    <a:lumMod val="95000"/>
-                    <a:lumOff val="5000"/>
-                  </a:schemeClr>
-                </a:solidFill>
-              </a:endParaRPr>
-            </a:p>
-          </p:txBody>
-        </p:sp>
-        <p:sp>
-          <p:nvSpPr>
-            <p:cNvPr id="28" name="Line Callout 2 (No Border) 27"/>
-            <p:cNvSpPr/>
-            <p:nvPr/>
-          </p:nvSpPr>
-          <p:spPr>
-            <a:xfrm>
-              <a:off x="6377568" y="4343400"/>
-              <a:ext cx="1242432" cy="202581"/>
-            </a:xfrm>
-            <a:prstGeom prst="callout2">
-              <a:avLst>
-                <a:gd name="adj1" fmla="val 50457"/>
-                <a:gd name="adj2" fmla="val 29"/>
-                <a:gd name="adj3" fmla="val 46787"/>
-                <a:gd name="adj4" fmla="val -38544"/>
-                <a:gd name="adj5" fmla="val -544403"/>
-                <a:gd name="adj6" fmla="val -71488"/>
-              </a:avLst>
-            </a:prstGeom>
-            <a:solidFill>
-              <a:schemeClr val="bg1"/>
-            </a:solidFill>
-            <a:ln w="15875">
-              <a:tailEnd type="stealth" w="sm" len="med"/>
-            </a:ln>
-          </p:spPr>
-          <p:style>
-            <a:lnRef idx="2">
-              <a:schemeClr val="accent1">
-                <a:shade val="50000"/>
-              </a:schemeClr>
-            </a:lnRef>
-            <a:fillRef idx="1">
-              <a:schemeClr val="accent1"/>
-            </a:fillRef>
-            <a:effectRef idx="0">
-              <a:schemeClr val="accent1"/>
-            </a:effectRef>
-            <a:fontRef idx="minor">
-              <a:schemeClr val="lt1"/>
-            </a:fontRef>
-          </p:style>
-          <p:txBody>
-            <a:bodyPr rtlCol="0" anchor="ctr"/>
-            <a:lstStyle/>
-            <a:p>
-              <a:r>
-                <a:rPr lang="en-US" sz="1050" b="1" dirty="0" err="1" smtClean="0">
-                  <a:solidFill>
-                    <a:schemeClr val="tx1">
-                      <a:lumMod val="95000"/>
-                      <a:lumOff val="5000"/>
-                    </a:schemeClr>
-                  </a:solidFill>
-                </a:rPr>
-                <a:t>domInteractive</a:t>
-              </a:r>
-              <a:endParaRPr lang="en-US" sz="1050" b="1" dirty="0">
-                <a:solidFill>
-                  <a:schemeClr val="tx1">
-                    <a:lumMod val="95000"/>
-                    <a:lumOff val="5000"/>
-                  </a:schemeClr>
-                </a:solidFill>
-              </a:endParaRPr>
-            </a:p>
-          </p:txBody>
-        </p:sp>
-        <p:sp>
-          <p:nvSpPr>
-            <p:cNvPr id="29" name="Line Callout 2 (No Border) 28"/>
-            <p:cNvSpPr/>
-            <p:nvPr/>
-          </p:nvSpPr>
-          <p:spPr>
-            <a:xfrm>
-              <a:off x="6659136" y="4114800"/>
-              <a:ext cx="1418064" cy="202581"/>
-            </a:xfrm>
-            <a:prstGeom prst="callout2">
-              <a:avLst>
-                <a:gd name="adj1" fmla="val 50457"/>
-                <a:gd name="adj2" fmla="val 29"/>
-                <a:gd name="adj3" fmla="val 46787"/>
-                <a:gd name="adj4" fmla="val -38544"/>
-                <a:gd name="adj5" fmla="val -463670"/>
-                <a:gd name="adj6" fmla="val -49947"/>
-              </a:avLst>
-            </a:prstGeom>
-            <a:solidFill>
-              <a:schemeClr val="bg1"/>
-            </a:solidFill>
-            <a:ln w="15875">
-              <a:tailEnd type="stealth" w="sm" len="med"/>
-            </a:ln>
-          </p:spPr>
-          <p:style>
-            <a:lnRef idx="2">
-              <a:schemeClr val="accent1">
-                <a:shade val="50000"/>
-              </a:schemeClr>
-            </a:lnRef>
-            <a:fillRef idx="1">
-              <a:schemeClr val="accent1"/>
-            </a:fillRef>
-            <a:effectRef idx="0">
-              <a:schemeClr val="accent1"/>
-            </a:effectRef>
-            <a:fontRef idx="minor">
-              <a:schemeClr val="lt1"/>
-            </a:fontRef>
-          </p:style>
-          <p:txBody>
-            <a:bodyPr rtlCol="0" anchor="ctr"/>
-            <a:lstStyle/>
-            <a:p>
-              <a:r>
-                <a:rPr lang="en-US" sz="1050" b="1" dirty="0" err="1" smtClean="0">
-                  <a:solidFill>
-                    <a:schemeClr val="tx1">
-                      <a:lumMod val="95000"/>
-                      <a:lumOff val="5000"/>
-                    </a:schemeClr>
-                  </a:solidFill>
-                </a:rPr>
-                <a:t>domContentLoaded</a:t>
-              </a:r>
-              <a:endParaRPr lang="en-US" sz="1050" b="1" dirty="0">
-                <a:solidFill>
-                  <a:schemeClr val="tx1">
-                    <a:lumMod val="95000"/>
-                    <a:lumOff val="5000"/>
-                  </a:schemeClr>
-                </a:solidFill>
-              </a:endParaRPr>
-            </a:p>
-          </p:txBody>
-        </p:sp>
-        <p:sp>
-          <p:nvSpPr>
-            <p:cNvPr id="30" name="Line Callout 2 (No Border) 29"/>
-            <p:cNvSpPr/>
-            <p:nvPr/>
-          </p:nvSpPr>
-          <p:spPr>
-            <a:xfrm>
-              <a:off x="6887736" y="3860181"/>
-              <a:ext cx="1242432" cy="202581"/>
-            </a:xfrm>
-            <a:prstGeom prst="callout2">
-              <a:avLst>
-                <a:gd name="adj1" fmla="val 50457"/>
-                <a:gd name="adj2" fmla="val 29"/>
-                <a:gd name="adj3" fmla="val 50457"/>
-                <a:gd name="adj4" fmla="val -11020"/>
-                <a:gd name="adj5" fmla="val -316881"/>
-                <a:gd name="adj6" fmla="val -14644"/>
-              </a:avLst>
-            </a:prstGeom>
-            <a:solidFill>
-              <a:schemeClr val="bg1"/>
-            </a:solidFill>
-            <a:ln w="15875">
-              <a:tailEnd type="stealth" w="sm" len="med"/>
-            </a:ln>
-          </p:spPr>
-          <p:style>
-            <a:lnRef idx="2">
-              <a:schemeClr val="accent1">
-                <a:shade val="50000"/>
-              </a:schemeClr>
-            </a:lnRef>
-            <a:fillRef idx="1">
-              <a:schemeClr val="accent1"/>
-            </a:fillRef>
-            <a:effectRef idx="0">
-              <a:schemeClr val="accent1"/>
-            </a:effectRef>
-            <a:fontRef idx="minor">
-              <a:schemeClr val="lt1"/>
-            </a:fontRef>
-          </p:style>
-          <p:txBody>
-            <a:bodyPr rtlCol="0" anchor="ctr"/>
-            <a:lstStyle/>
-            <a:p>
-              <a:r>
-                <a:rPr lang="en-US" sz="1050" b="1" dirty="0" err="1" smtClean="0">
-                  <a:solidFill>
-                    <a:schemeClr val="tx1">
-                      <a:lumMod val="95000"/>
-                      <a:lumOff val="5000"/>
-                    </a:schemeClr>
-                  </a:solidFill>
-                </a:rPr>
-                <a:t>domComplete</a:t>
-              </a:r>
-              <a:endParaRPr lang="en-US" sz="1050" b="1" dirty="0">
-                <a:solidFill>
-                  <a:schemeClr val="tx1">
-                    <a:lumMod val="95000"/>
-                    <a:lumOff val="5000"/>
-                  </a:schemeClr>
-                </a:solidFill>
-              </a:endParaRPr>
-            </a:p>
-          </p:txBody>
-        </p:sp>
-        <p:sp>
-          <p:nvSpPr>
-            <p:cNvPr id="31" name="Line Callout 2 (No Border) 30"/>
-            <p:cNvSpPr/>
-            <p:nvPr/>
-          </p:nvSpPr>
-          <p:spPr>
-            <a:xfrm>
-              <a:off x="7368168" y="3657600"/>
-              <a:ext cx="1242432" cy="202581"/>
-            </a:xfrm>
-            <a:prstGeom prst="callout2">
-              <a:avLst>
-                <a:gd name="adj1" fmla="val 50457"/>
-                <a:gd name="adj2" fmla="val 29"/>
-                <a:gd name="adj3" fmla="val 46787"/>
-                <a:gd name="adj4" fmla="val -20593"/>
-                <a:gd name="adj5" fmla="val -228808"/>
-                <a:gd name="adj6" fmla="val -39177"/>
-              </a:avLst>
-            </a:prstGeom>
-            <a:solidFill>
-              <a:schemeClr val="bg1"/>
-            </a:solidFill>
-            <a:ln w="15875">
-              <a:tailEnd type="stealth" w="sm" len="med"/>
-            </a:ln>
-          </p:spPr>
-          <p:style>
-            <a:lnRef idx="2">
-              <a:schemeClr val="accent1">
-                <a:shade val="50000"/>
-              </a:schemeClr>
-            </a:lnRef>
-            <a:fillRef idx="1">
-              <a:schemeClr val="accent1"/>
-            </a:fillRef>
-            <a:effectRef idx="0">
-              <a:schemeClr val="accent1"/>
-            </a:effectRef>
-            <a:fontRef idx="minor">
-              <a:schemeClr val="lt1"/>
-            </a:fontRef>
-          </p:style>
-          <p:txBody>
-            <a:bodyPr rtlCol="0" anchor="ctr"/>
-            <a:lstStyle/>
-            <a:p>
-              <a:r>
-                <a:rPr lang="en-US" sz="1050" b="1" dirty="0" err="1" smtClean="0">
-                  <a:solidFill>
-                    <a:schemeClr val="tx1">
-                      <a:lumMod val="95000"/>
-                      <a:lumOff val="5000"/>
-                    </a:schemeClr>
-                  </a:solidFill>
-                </a:rPr>
-                <a:t>loadEventStart</a:t>
-              </a:r>
-              <a:endParaRPr lang="en-US" sz="1050" b="1" dirty="0">
-                <a:solidFill>
-                  <a:schemeClr val="tx1">
-                    <a:lumMod val="95000"/>
-                    <a:lumOff val="5000"/>
-                  </a:schemeClr>
-                </a:solidFill>
-              </a:endParaRPr>
-            </a:p>
-          </p:txBody>
-        </p:sp>
-      </p:grpSp>
-      <p:sp>
-        <p:nvSpPr>
-          <p:cNvPr id="32" name="Line Callout 2 (No Border) 31"/>
+      <p:sp>
+        <p:nvSpPr>
+          <p:cNvPr id="31" name="Line Callout 2 (No Border) 30"/>
           <p:cNvSpPr/>
           <p:nvPr/>
         </p:nvSpPr>
         <p:spPr>
           <a:xfrm>
-            <a:off x="7672968" y="3429000"/>
+            <a:off x="7848600" y="4191000"/>
             <a:ext cx="1242432" cy="202581"/>
           </a:xfrm>
           <a:prstGeom prst="callout2">
             <a:avLst>
               <a:gd name="adj1" fmla="val 50457"/>
               <a:gd name="adj2" fmla="val 29"/>
-              <a:gd name="adj3" fmla="val 50457"/>
-              <a:gd name="adj4" fmla="val -9823"/>
-              <a:gd name="adj5" fmla="val -111377"/>
-              <a:gd name="adj6" fmla="val -5071"/>
+              <a:gd name="adj3" fmla="val 46787"/>
+              <a:gd name="adj4" fmla="val -20593"/>
+              <a:gd name="adj5" fmla="val -222412"/>
+              <a:gd name="adj6" fmla="val 17146"/>
             </a:avLst>
           </a:prstGeom>
           <a:solidFill>
@@ -4806,113 +3110,6 @@
             <a:r>
               <a:rPr lang="en-US" sz="1050" b="1" dirty="0" err="1" smtClean="0">
                 <a:solidFill>
-                  <a:schemeClr val="tx1">
-                    <a:lumMod val="95000"/>
-                    <a:lumOff val="5000"/>
-                  </a:schemeClr>
-                </a:solidFill>
-              </a:rPr>
-              <a:t>loadEventEnd</a:t>
-            </a:r>
-            <a:endParaRPr lang="en-US" sz="1050" b="1" dirty="0">
-              <a:solidFill>
-                <a:schemeClr val="tx1">
-                  <a:lumMod val="95000"/>
-                  <a:lumOff val="5000"/>
-                </a:schemeClr>
-              </a:solidFill>
-            </a:endParaRPr>
-          </a:p>
-        </p:txBody>
-      </p:sp>
-    </p:spTree>
-    <p:extLst>
-      <p:ext uri="{BB962C8B-B14F-4D97-AF65-F5344CB8AC3E}">
-        <p14:creationId xmlns:p14="http://schemas.microsoft.com/office/powerpoint/2010/main" xmlns="" val="1514229708"/>
-      </p:ext>
-    </p:extLst>
-  </p:cSld>
-  <p:clrMapOvr>
-    <a:masterClrMapping/>
-  </p:clrMapOvr>
-  <p:timing>
-    <p:tnLst>
-      <p:par>
-        <p:cTn id="1" dur="indefinite" restart="never" nodeType="tmRoot"/>
-      </p:par>
-    </p:tnLst>
-  </p:timing>
-</p:sld>
-</file>
-
-<file path=ppt/slides/slide2.xml><?xml version="1.0" encoding="utf-8"?>
-<p:sld xmlns:a="http://schemas.openxmlformats.org/drawingml/2006/main" xmlns:r="http://schemas.openxmlformats.org/officeDocument/2006/relationships" xmlns:p="http://schemas.openxmlformats.org/presentationml/2006/main">
-  <p:cSld>
-    <p:spTree>
-      <p:nvGrpSpPr>
-        <p:cNvPr id="1" name=""/>
-        <p:cNvGrpSpPr/>
-        <p:nvPr/>
-      </p:nvGrpSpPr>
-      <p:grpSpPr>
-        <a:xfrm>
-          <a:off x="0" y="0"/>
-          <a:ext cx="0" cy="0"/>
-          <a:chOff x="0" y="0"/>
-          <a:chExt cx="0" cy="0"/>
-        </a:xfrm>
-      </p:grpSpPr>
-      <p:sp>
-        <p:nvSpPr>
-          <p:cNvPr id="31" name="Line Callout 2 (No Border) 30"/>
-          <p:cNvSpPr/>
-          <p:nvPr/>
-        </p:nvSpPr>
-        <p:spPr>
-          <a:xfrm>
-            <a:off x="7872472" y="4191000"/>
-            <a:ext cx="1242432" cy="202581"/>
-          </a:xfrm>
-          <a:prstGeom prst="callout2">
-            <a:avLst>
-              <a:gd name="adj1" fmla="val 50457"/>
-              <a:gd name="adj2" fmla="val 29"/>
-              <a:gd name="adj3" fmla="val 46787"/>
-              <a:gd name="adj4" fmla="val -20593"/>
-              <a:gd name="adj5" fmla="val -228808"/>
-              <a:gd name="adj6" fmla="val -39177"/>
-            </a:avLst>
-          </a:prstGeom>
-          <a:solidFill>
-            <a:schemeClr val="bg1"/>
-          </a:solidFill>
-          <a:ln w="15875">
-            <a:tailEnd type="stealth" w="sm" len="med"/>
-          </a:ln>
-        </p:spPr>
-        <p:style>
-          <a:lnRef idx="2">
-            <a:schemeClr val="accent1">
-              <a:shade val="50000"/>
-            </a:schemeClr>
-          </a:lnRef>
-          <a:fillRef idx="1">
-            <a:schemeClr val="accent1"/>
-          </a:fillRef>
-          <a:effectRef idx="0">
-            <a:schemeClr val="accent1"/>
-          </a:effectRef>
-          <a:fontRef idx="minor">
-            <a:schemeClr val="lt1"/>
-          </a:fontRef>
-        </p:style>
-        <p:txBody>
-          <a:bodyPr rtlCol="0" anchor="ctr"/>
-          <a:lstStyle/>
-          <a:p>
-            <a:r>
-              <a:rPr lang="en-US" sz="1050" b="1" dirty="0" err="1" smtClean="0">
-                <a:solidFill>
                   <a:prstClr val="black">
                     <a:lumMod val="95000"/>
                     <a:lumOff val="5000"/>
@@ -4940,7 +3137,7 @@
         </p:nvSpPr>
         <p:spPr>
           <a:xfrm>
-            <a:off x="152399" y="3202258"/>
+            <a:off x="0" y="3202258"/>
             <a:ext cx="609600" cy="533400"/>
           </a:xfrm>
           <a:prstGeom prst="rect">
@@ -4996,7 +3193,7 @@
         </p:nvSpPr>
         <p:spPr>
           <a:xfrm>
-            <a:off x="1828800" y="3202258"/>
+            <a:off x="2514601" y="3202258"/>
             <a:ext cx="503664" cy="533400"/>
           </a:xfrm>
           <a:prstGeom prst="rect">
@@ -5060,7 +3257,7 @@
         </p:nvSpPr>
         <p:spPr>
           <a:xfrm>
-            <a:off x="2391936" y="3200400"/>
+            <a:off x="3077737" y="3200400"/>
             <a:ext cx="457200" cy="533400"/>
           </a:xfrm>
           <a:prstGeom prst="rect">
@@ -5124,7 +3321,7 @@
         </p:nvSpPr>
         <p:spPr>
           <a:xfrm>
-            <a:off x="2895600" y="3200400"/>
+            <a:off x="3581401" y="3200400"/>
             <a:ext cx="457200" cy="533400"/>
           </a:xfrm>
           <a:prstGeom prst="rect">
@@ -5188,7 +3385,7 @@
         </p:nvSpPr>
         <p:spPr>
           <a:xfrm>
-            <a:off x="3429000" y="3200400"/>
+            <a:off x="4114801" y="3200400"/>
             <a:ext cx="1066800" cy="533400"/>
           </a:xfrm>
           <a:prstGeom prst="rect">
@@ -5252,7 +3449,7 @@
         </p:nvSpPr>
         <p:spPr>
           <a:xfrm>
-            <a:off x="4495800" y="3200400"/>
+            <a:off x="5181601" y="3200400"/>
             <a:ext cx="1066800" cy="533400"/>
           </a:xfrm>
           <a:prstGeom prst="rect">
@@ -5316,7 +3513,7 @@
         </p:nvSpPr>
         <p:spPr>
           <a:xfrm>
-            <a:off x="7385536" y="3200400"/>
+            <a:off x="8071337" y="3200400"/>
             <a:ext cx="762000" cy="533400"/>
           </a:xfrm>
           <a:prstGeom prst="rect">
@@ -5380,7 +3577,7 @@
         </p:nvSpPr>
         <p:spPr>
           <a:xfrm>
-            <a:off x="5625501" y="3200400"/>
+            <a:off x="6311302" y="3200400"/>
             <a:ext cx="1761893" cy="533400"/>
           </a:xfrm>
           <a:prstGeom prst="rect">
@@ -5436,7 +3633,7 @@
         </p:nvSpPr>
         <p:spPr>
           <a:xfrm>
-            <a:off x="2819400" y="682758"/>
+            <a:off x="3505201" y="682758"/>
             <a:ext cx="1066800" cy="202581"/>
           </a:xfrm>
           <a:prstGeom prst="callout2">
@@ -5506,7 +3703,7 @@
         </p:nvSpPr>
         <p:spPr>
           <a:xfrm>
-            <a:off x="3116766" y="1120699"/>
+            <a:off x="3802567" y="1120699"/>
             <a:ext cx="1173480" cy="202581"/>
           </a:xfrm>
           <a:prstGeom prst="callout2">
@@ -5576,7 +3773,7 @@
         </p:nvSpPr>
         <p:spPr>
           <a:xfrm>
-            <a:off x="3506130" y="1310272"/>
+            <a:off x="4191931" y="1310272"/>
             <a:ext cx="1424568" cy="202581"/>
           </a:xfrm>
           <a:prstGeom prst="callout2">
@@ -5646,7 +3843,7 @@
         </p:nvSpPr>
         <p:spPr>
           <a:xfrm>
-            <a:off x="3695700" y="1496121"/>
+            <a:off x="4381501" y="1496121"/>
             <a:ext cx="1242432" cy="202581"/>
           </a:xfrm>
           <a:prstGeom prst="callout2">
@@ -5716,7 +3913,7 @@
         </p:nvSpPr>
         <p:spPr>
           <a:xfrm>
-            <a:off x="4038600" y="1702419"/>
+            <a:off x="4724401" y="1702419"/>
             <a:ext cx="1242432" cy="202581"/>
           </a:xfrm>
           <a:prstGeom prst="callout2">
@@ -5786,7 +3983,7 @@
         </p:nvSpPr>
         <p:spPr>
           <a:xfrm>
-            <a:off x="4472568" y="2133600"/>
+            <a:off x="5158369" y="2133600"/>
             <a:ext cx="1242432" cy="202581"/>
           </a:xfrm>
           <a:prstGeom prst="callout2">
@@ -5856,7 +4053,7 @@
         </p:nvSpPr>
         <p:spPr>
           <a:xfrm>
-            <a:off x="4701168" y="2312019"/>
+            <a:off x="5386969" y="2312019"/>
             <a:ext cx="1242432" cy="202581"/>
           </a:xfrm>
           <a:prstGeom prst="callout2">
@@ -5926,7 +4123,7 @@
         </p:nvSpPr>
         <p:spPr>
           <a:xfrm>
-            <a:off x="5144430" y="2518317"/>
+            <a:off x="5830231" y="2518317"/>
             <a:ext cx="1242432" cy="202581"/>
           </a:xfrm>
           <a:prstGeom prst="callout2">
@@ -5996,7 +4193,7 @@
         </p:nvSpPr>
         <p:spPr>
           <a:xfrm>
-            <a:off x="5638800" y="2728332"/>
+            <a:off x="6324601" y="2728332"/>
             <a:ext cx="1242432" cy="202581"/>
           </a:xfrm>
           <a:prstGeom prst="callout2">
@@ -6066,7 +4263,7 @@
         </p:nvSpPr>
         <p:spPr>
           <a:xfrm>
-            <a:off x="6225168" y="5536581"/>
+            <a:off x="6529968" y="5588619"/>
             <a:ext cx="1242432" cy="202581"/>
           </a:xfrm>
           <a:prstGeom prst="callout2">
@@ -6075,8 +4272,8 @@
               <a:gd name="adj2" fmla="val 29"/>
               <a:gd name="adj3" fmla="val 46787"/>
               <a:gd name="adj4" fmla="val -38544"/>
-              <a:gd name="adj5" fmla="val -697795"/>
-              <a:gd name="adj6" fmla="val -138465"/>
+              <a:gd name="adj5" fmla="val -685002"/>
+              <a:gd name="adj6" fmla="val -392960"/>
             </a:avLst>
           </a:prstGeom>
           <a:solidFill>
@@ -6136,7 +4333,7 @@
         </p:nvSpPr>
         <p:spPr>
           <a:xfrm>
-            <a:off x="6439830" y="5304264"/>
+            <a:off x="6758568" y="5356302"/>
             <a:ext cx="1242432" cy="202581"/>
           </a:xfrm>
           <a:prstGeom prst="callout2">
@@ -6145,8 +4342,8 @@
               <a:gd name="adj2" fmla="val 29"/>
               <a:gd name="adj3" fmla="val 46787"/>
               <a:gd name="adj4" fmla="val -38544"/>
-              <a:gd name="adj5" fmla="val -582744"/>
-              <a:gd name="adj6" fmla="val -110070"/>
+              <a:gd name="adj5" fmla="val -569951"/>
+              <a:gd name="adj6" fmla="val -363522"/>
             </a:avLst>
           </a:prstGeom>
           <a:solidFill>
@@ -6206,17 +4403,17 @@
         </p:nvSpPr>
         <p:spPr>
           <a:xfrm>
-            <a:off x="6805672" y="5105400"/>
+            <a:off x="7010400" y="5105400"/>
             <a:ext cx="1242432" cy="202581"/>
           </a:xfrm>
           <a:prstGeom prst="callout2">
             <a:avLst>
               <a:gd name="adj1" fmla="val 50457"/>
-              <a:gd name="adj2" fmla="val 29"/>
+              <a:gd name="adj2" fmla="val -1014"/>
               <a:gd name="adj3" fmla="val 46787"/>
-              <a:gd name="adj4" fmla="val -38544"/>
-              <a:gd name="adj5" fmla="val -672843"/>
-              <a:gd name="adj6" fmla="val -91233"/>
+              <a:gd name="adj4" fmla="val -37501"/>
+              <a:gd name="adj5" fmla="val -660050"/>
+              <a:gd name="adj6" fmla="val -49513"/>
             </a:avLst>
           </a:prstGeom>
           <a:solidFill>
@@ -6276,7 +4473,7 @@
         </p:nvSpPr>
         <p:spPr>
           <a:xfrm>
-            <a:off x="6981304" y="4876800"/>
+            <a:off x="7162800" y="4876800"/>
             <a:ext cx="1242432" cy="202581"/>
           </a:xfrm>
           <a:prstGeom prst="callout2">
@@ -6285,8 +4482,8 @@
               <a:gd name="adj2" fmla="val 29"/>
               <a:gd name="adj3" fmla="val 46787"/>
               <a:gd name="adj4" fmla="val -38544"/>
-              <a:gd name="adj5" fmla="val -559082"/>
-              <a:gd name="adj6" fmla="val -71488"/>
+              <a:gd name="adj5" fmla="val -546289"/>
+              <a:gd name="adj6" fmla="val -36026"/>
             </a:avLst>
           </a:prstGeom>
           <a:solidFill>
@@ -6346,7 +4543,7 @@
         </p:nvSpPr>
         <p:spPr>
           <a:xfrm>
-            <a:off x="7262872" y="4648200"/>
+            <a:off x="7315200" y="4648200"/>
             <a:ext cx="1418064" cy="202581"/>
           </a:xfrm>
           <a:prstGeom prst="callout2">
@@ -6355,8 +4552,8 @@
               <a:gd name="adj2" fmla="val 29"/>
               <a:gd name="adj3" fmla="val 46787"/>
               <a:gd name="adj4" fmla="val -38544"/>
-              <a:gd name="adj5" fmla="val -430643"/>
-              <a:gd name="adj6" fmla="val -49947"/>
+              <a:gd name="adj5" fmla="val -437040"/>
+              <a:gd name="adj6" fmla="val -10652"/>
             </a:avLst>
           </a:prstGeom>
           <a:solidFill>
@@ -6416,7 +4613,7 @@
         </p:nvSpPr>
         <p:spPr>
           <a:xfrm>
-            <a:off x="7491472" y="4393581"/>
+            <a:off x="7520568" y="4393581"/>
             <a:ext cx="1242432" cy="202581"/>
           </a:xfrm>
           <a:prstGeom prst="callout2">
@@ -6426,7 +4623,7 @@
               <a:gd name="adj3" fmla="val 50457"/>
               <a:gd name="adj4" fmla="val -11020"/>
               <a:gd name="adj5" fmla="val -316881"/>
-              <a:gd name="adj6" fmla="val -14644"/>
+              <a:gd name="adj6" fmla="val 37507"/>
             </a:avLst>
           </a:prstGeom>
           <a:solidFill>
@@ -6486,7 +4683,7 @@
         </p:nvSpPr>
         <p:spPr>
           <a:xfrm>
-            <a:off x="8053968" y="3962400"/>
+            <a:off x="8153400" y="3962400"/>
             <a:ext cx="1013832" cy="202581"/>
           </a:xfrm>
           <a:prstGeom prst="callout2">
@@ -6495,8 +4692,8 @@
               <a:gd name="adj2" fmla="val 29"/>
               <a:gd name="adj3" fmla="val 50457"/>
               <a:gd name="adj4" fmla="val -9823"/>
-              <a:gd name="adj5" fmla="val -96496"/>
-              <a:gd name="adj6" fmla="val 9796"/>
+              <a:gd name="adj5" fmla="val -102893"/>
+              <a:gd name="adj6" fmla="val 67315"/>
             </a:avLst>
           </a:prstGeom>
           <a:solidFill>
@@ -6556,7 +4753,7 @@
         </p:nvSpPr>
         <p:spPr>
           <a:xfrm>
-            <a:off x="838200" y="3202258"/>
+            <a:off x="1524001" y="3202258"/>
             <a:ext cx="934496" cy="533400"/>
           </a:xfrm>
           <a:prstGeom prst="rect">
@@ -6620,7 +4817,7 @@
         </p:nvSpPr>
         <p:spPr>
           <a:xfrm>
-            <a:off x="2895600" y="914400"/>
+            <a:off x="3581401" y="914400"/>
             <a:ext cx="1066800" cy="202581"/>
           </a:xfrm>
           <a:prstGeom prst="callout2">
@@ -6690,17 +4887,17 @@
         </p:nvSpPr>
         <p:spPr>
           <a:xfrm>
-            <a:off x="2667000" y="457200"/>
+            <a:off x="2590800" y="102219"/>
             <a:ext cx="1066800" cy="202581"/>
           </a:xfrm>
           <a:prstGeom prst="callout2">
             <a:avLst>
-              <a:gd name="adj1" fmla="val 50457"/>
+              <a:gd name="adj1" fmla="val 76043"/>
               <a:gd name="adj2" fmla="val 29"/>
-              <a:gd name="adj3" fmla="val 50457"/>
-              <a:gd name="adj4" fmla="val -52904"/>
-              <a:gd name="adj5" fmla="val 1350907"/>
-              <a:gd name="adj6" fmla="val -175679"/>
+              <a:gd name="adj3" fmla="val 69646"/>
+              <a:gd name="adj4" fmla="val -124573"/>
+              <a:gd name="adj5" fmla="val 1530008"/>
+              <a:gd name="adj6" fmla="val -184182"/>
             </a:avLst>
           </a:prstGeom>
           <a:solidFill>
@@ -6760,7 +4957,7 @@
         </p:nvSpPr>
         <p:spPr>
           <a:xfrm>
-            <a:off x="4495800" y="3581400"/>
+            <a:off x="1614138" y="3633438"/>
             <a:ext cx="588880" cy="533400"/>
           </a:xfrm>
           <a:prstGeom prst="rect">
@@ -6824,7 +5021,7 @@
         </p:nvSpPr>
         <p:spPr>
           <a:xfrm>
-            <a:off x="4320168" y="1931019"/>
+            <a:off x="5005969" y="1931019"/>
             <a:ext cx="1623432" cy="202581"/>
           </a:xfrm>
           <a:prstGeom prst="callout2">
@@ -6908,10 +5105,261 @@
           </a:p>
         </p:txBody>
       </p:sp>
+      <p:sp>
+        <p:nvSpPr>
+          <p:cNvPr id="37" name="Rectangle 36"/>
+          <p:cNvSpPr/>
+          <p:nvPr/>
+        </p:nvSpPr>
+        <p:spPr>
+          <a:xfrm>
+            <a:off x="685800" y="3200400"/>
+            <a:ext cx="762000" cy="533400"/>
+          </a:xfrm>
+          <a:prstGeom prst="rect">
+            <a:avLst/>
+          </a:prstGeom>
+          <a:solidFill>
+            <a:schemeClr val="accent5">
+              <a:lumMod val="40000"/>
+              <a:lumOff val="60000"/>
+            </a:schemeClr>
+          </a:solidFill>
+        </p:spPr>
+        <p:style>
+          <a:lnRef idx="2">
+            <a:schemeClr val="accent1">
+              <a:shade val="50000"/>
+            </a:schemeClr>
+          </a:lnRef>
+          <a:fillRef idx="1">
+            <a:schemeClr val="accent1"/>
+          </a:fillRef>
+          <a:effectRef idx="0">
+            <a:schemeClr val="accent1"/>
+          </a:effectRef>
+          <a:fontRef idx="minor">
+            <a:schemeClr val="lt1"/>
+          </a:fontRef>
+        </p:style>
+        <p:txBody>
+          <a:bodyPr rtlCol="0" anchor="ctr"/>
+          <a:lstStyle/>
+          <a:p>
+            <a:pPr algn="ctr"/>
+            <a:r>
+              <a:rPr lang="en-US" sz="1000" b="1" dirty="0" smtClean="0">
+                <a:solidFill>
+                  <a:schemeClr val="tx1">
+                    <a:lumMod val="95000"/>
+                    <a:lumOff val="5000"/>
+                  </a:schemeClr>
+                </a:solidFill>
+              </a:rPr>
+              <a:t>Negotiate</a:t>
+            </a:r>
+          </a:p>
+          <a:p>
+            <a:pPr algn="ctr"/>
+            <a:r>
+              <a:rPr lang="en-US" sz="1000" b="1" dirty="0" smtClean="0">
+                <a:solidFill>
+                  <a:schemeClr val="tx1">
+                    <a:lumMod val="95000"/>
+                    <a:lumOff val="5000"/>
+                  </a:schemeClr>
+                </a:solidFill>
+              </a:rPr>
+              <a:t>L</a:t>
+            </a:r>
+            <a:r>
+              <a:rPr lang="en-US" sz="1000" b="1" dirty="0" smtClean="0">
+                <a:solidFill>
+                  <a:schemeClr val="tx1">
+                    <a:lumMod val="95000"/>
+                    <a:lumOff val="5000"/>
+                  </a:schemeClr>
+                </a:solidFill>
+              </a:rPr>
+              <a:t>ink</a:t>
+            </a:r>
+            <a:endParaRPr lang="en-US" sz="1000" b="1" dirty="0">
+              <a:solidFill>
+                <a:schemeClr val="tx1">
+                  <a:lumMod val="95000"/>
+                  <a:lumOff val="5000"/>
+                </a:schemeClr>
+              </a:solidFill>
+            </a:endParaRPr>
+          </a:p>
+        </p:txBody>
+      </p:sp>
+      <p:sp>
+        <p:nvSpPr>
+          <p:cNvPr id="40" name="Line Callout 2 (No Border) 39"/>
+          <p:cNvSpPr/>
+          <p:nvPr/>
+        </p:nvSpPr>
+        <p:spPr>
+          <a:xfrm>
+            <a:off x="2590800" y="304800"/>
+            <a:ext cx="1371600" cy="152400"/>
+          </a:xfrm>
+          <a:prstGeom prst="callout2">
+            <a:avLst>
+              <a:gd name="adj1" fmla="val 50457"/>
+              <a:gd name="adj2" fmla="val 29"/>
+              <a:gd name="adj3" fmla="val 41954"/>
+              <a:gd name="adj4" fmla="val -69910"/>
+              <a:gd name="adj5" fmla="val 1872661"/>
+              <a:gd name="adj6" fmla="val -137770"/>
+            </a:avLst>
+          </a:prstGeom>
+          <a:solidFill>
+            <a:schemeClr val="bg1"/>
+          </a:solidFill>
+          <a:ln w="15875">
+            <a:tailEnd type="stealth" w="sm" len="med"/>
+          </a:ln>
+        </p:spPr>
+        <p:style>
+          <a:lnRef idx="2">
+            <a:schemeClr val="accent1">
+              <a:shade val="50000"/>
+            </a:schemeClr>
+          </a:lnRef>
+          <a:fillRef idx="1">
+            <a:schemeClr val="accent1"/>
+          </a:fillRef>
+          <a:effectRef idx="0">
+            <a:schemeClr val="accent1"/>
+          </a:effectRef>
+          <a:fontRef idx="minor">
+            <a:schemeClr val="lt1"/>
+          </a:fontRef>
+        </p:style>
+        <p:txBody>
+          <a:bodyPr rtlCol="0" anchor="ctr"/>
+          <a:lstStyle/>
+          <a:p>
+            <a:r>
+              <a:rPr lang="en-US" sz="1050" b="1" dirty="0" err="1" smtClean="0">
+                <a:solidFill>
+                  <a:schemeClr val="tx1">
+                    <a:lumMod val="95000"/>
+                    <a:lumOff val="5000"/>
+                  </a:schemeClr>
+                </a:solidFill>
+              </a:rPr>
+              <a:t>linkNego</a:t>
+            </a:r>
+            <a:r>
+              <a:rPr lang="en-US" sz="1050" b="1" dirty="0" err="1" smtClean="0">
+                <a:solidFill>
+                  <a:schemeClr val="tx1">
+                    <a:lumMod val="95000"/>
+                    <a:lumOff val="5000"/>
+                  </a:schemeClr>
+                </a:solidFill>
+              </a:rPr>
+              <a:t>tiationStart</a:t>
+            </a:r>
+            <a:endParaRPr lang="en-US" sz="1050" b="1" dirty="0">
+              <a:solidFill>
+                <a:schemeClr val="tx1">
+                  <a:lumMod val="95000"/>
+                  <a:lumOff val="5000"/>
+                </a:schemeClr>
+              </a:solidFill>
+            </a:endParaRPr>
+          </a:p>
+        </p:txBody>
+      </p:sp>
+      <p:sp>
+        <p:nvSpPr>
+          <p:cNvPr id="41" name="Line Callout 2 (No Border) 40"/>
+          <p:cNvSpPr/>
+          <p:nvPr/>
+        </p:nvSpPr>
+        <p:spPr>
+          <a:xfrm>
+            <a:off x="3124200" y="533400"/>
+            <a:ext cx="1371600" cy="152400"/>
+          </a:xfrm>
+          <a:prstGeom prst="callout2">
+            <a:avLst>
+              <a:gd name="adj1" fmla="val 50457"/>
+              <a:gd name="adj2" fmla="val 29"/>
+              <a:gd name="adj3" fmla="val 41954"/>
+              <a:gd name="adj4" fmla="val -73689"/>
+              <a:gd name="adj5" fmla="val 1770630"/>
+              <a:gd name="adj6" fmla="val -124543"/>
+            </a:avLst>
+          </a:prstGeom>
+          <a:solidFill>
+            <a:schemeClr val="bg1"/>
+          </a:solidFill>
+          <a:ln w="15875">
+            <a:tailEnd type="stealth" w="sm" len="med"/>
+          </a:ln>
+        </p:spPr>
+        <p:style>
+          <a:lnRef idx="2">
+            <a:schemeClr val="accent1">
+              <a:shade val="50000"/>
+            </a:schemeClr>
+          </a:lnRef>
+          <a:fillRef idx="1">
+            <a:schemeClr val="accent1"/>
+          </a:fillRef>
+          <a:effectRef idx="0">
+            <a:schemeClr val="accent1"/>
+          </a:effectRef>
+          <a:fontRef idx="minor">
+            <a:schemeClr val="lt1"/>
+          </a:fontRef>
+        </p:style>
+        <p:txBody>
+          <a:bodyPr rtlCol="0" anchor="ctr"/>
+          <a:lstStyle/>
+          <a:p>
+            <a:r>
+              <a:rPr lang="en-US" sz="1050" b="1" dirty="0" err="1" smtClean="0">
+                <a:solidFill>
+                  <a:schemeClr val="tx1">
+                    <a:lumMod val="95000"/>
+                    <a:lumOff val="5000"/>
+                  </a:schemeClr>
+                </a:solidFill>
+              </a:rPr>
+              <a:t>linkNego</a:t>
+            </a:r>
+            <a:r>
+              <a:rPr lang="en-US" sz="1050" b="1" dirty="0" err="1" smtClean="0">
+                <a:solidFill>
+                  <a:schemeClr val="tx1">
+                    <a:lumMod val="95000"/>
+                    <a:lumOff val="5000"/>
+                  </a:schemeClr>
+                </a:solidFill>
+              </a:rPr>
+              <a:t>tiationEnd</a:t>
+            </a:r>
+            <a:endParaRPr lang="en-US" sz="1050" b="1" dirty="0">
+              <a:solidFill>
+                <a:schemeClr val="tx1">
+                  <a:lumMod val="95000"/>
+                  <a:lumOff val="5000"/>
+                </a:schemeClr>
+              </a:solidFill>
+            </a:endParaRPr>
+          </a:p>
+        </p:txBody>
+      </p:sp>
     </p:spTree>
     <p:extLst>
       <p:ext uri="{BB962C8B-B14F-4D97-AF65-F5344CB8AC3E}">
-        <p14:creationId xmlns:p14="http://schemas.microsoft.com/office/powerpoint/2010/main" xmlns="" val="3625791706"/>
+        <p14:creationId xmlns="" xmlns:p14="http://schemas.microsoft.com/office/powerpoint/2010/main" xmlns:p="http://schemas.openxmlformats.org/presentationml/2006/main" xmlns:r="http://schemas.openxmlformats.org/officeDocument/2006/relationships" xmlns:a="http://schemas.openxmlformats.org/drawingml/2006/main" val="3625791706"/>
       </p:ext>
     </p:extLst>
   </p:cSld>

</xml_diff>

<commit_message>
Added more description to processing model. Updated the chart to show linkNegotiation is optional.
</commit_message>
<xml_diff>
--- a/nt-charts.pptx
+++ b/nt-charts.pptx
@@ -289,7 +289,7 @@
             <a:fld id="{1D8BD707-D9CF-40AE-B4C6-C98DA3205C09}" type="datetimeFigureOut">
               <a:rPr lang="en-US" smtClean="0"/>
               <a:pPr/>
-              <a:t>8/27/12</a:t>
+              <a:t>8/31/12</a:t>
             </a:fld>
             <a:endParaRPr lang="en-US"/>
           </a:p>
@@ -456,7 +456,7 @@
             <a:fld id="{1D8BD707-D9CF-40AE-B4C6-C98DA3205C09}" type="datetimeFigureOut">
               <a:rPr lang="en-US" smtClean="0"/>
               <a:pPr/>
-              <a:t>8/27/12</a:t>
+              <a:t>8/31/12</a:t>
             </a:fld>
             <a:endParaRPr lang="en-US"/>
           </a:p>
@@ -633,7 +633,7 @@
             <a:fld id="{1D8BD707-D9CF-40AE-B4C6-C98DA3205C09}" type="datetimeFigureOut">
               <a:rPr lang="en-US" smtClean="0"/>
               <a:pPr/>
-              <a:t>8/27/12</a:t>
+              <a:t>8/31/12</a:t>
             </a:fld>
             <a:endParaRPr lang="en-US"/>
           </a:p>
@@ -800,7 +800,7 @@
             <a:fld id="{1D8BD707-D9CF-40AE-B4C6-C98DA3205C09}" type="datetimeFigureOut">
               <a:rPr lang="en-US" smtClean="0"/>
               <a:pPr/>
-              <a:t>8/27/12</a:t>
+              <a:t>8/31/12</a:t>
             </a:fld>
             <a:endParaRPr lang="en-US"/>
           </a:p>
@@ -1043,7 +1043,7 @@
             <a:fld id="{1D8BD707-D9CF-40AE-B4C6-C98DA3205C09}" type="datetimeFigureOut">
               <a:rPr lang="en-US" smtClean="0"/>
               <a:pPr/>
-              <a:t>8/27/12</a:t>
+              <a:t>8/31/12</a:t>
             </a:fld>
             <a:endParaRPr lang="en-US"/>
           </a:p>
@@ -1328,7 +1328,7 @@
             <a:fld id="{1D8BD707-D9CF-40AE-B4C6-C98DA3205C09}" type="datetimeFigureOut">
               <a:rPr lang="en-US" smtClean="0"/>
               <a:pPr/>
-              <a:t>8/27/12</a:t>
+              <a:t>8/31/12</a:t>
             </a:fld>
             <a:endParaRPr lang="en-US"/>
           </a:p>
@@ -1747,7 +1747,7 @@
             <a:fld id="{1D8BD707-D9CF-40AE-B4C6-C98DA3205C09}" type="datetimeFigureOut">
               <a:rPr lang="en-US" smtClean="0"/>
               <a:pPr/>
-              <a:t>8/27/12</a:t>
+              <a:t>8/31/12</a:t>
             </a:fld>
             <a:endParaRPr lang="en-US"/>
           </a:p>
@@ -1862,7 +1862,7 @@
             <a:fld id="{1D8BD707-D9CF-40AE-B4C6-C98DA3205C09}" type="datetimeFigureOut">
               <a:rPr lang="en-US" smtClean="0"/>
               <a:pPr/>
-              <a:t>8/27/12</a:t>
+              <a:t>8/31/12</a:t>
             </a:fld>
             <a:endParaRPr lang="en-US"/>
           </a:p>
@@ -1954,7 +1954,7 @@
             <a:fld id="{1D8BD707-D9CF-40AE-B4C6-C98DA3205C09}" type="datetimeFigureOut">
               <a:rPr lang="en-US" smtClean="0"/>
               <a:pPr/>
-              <a:t>8/27/12</a:t>
+              <a:t>8/31/12</a:t>
             </a:fld>
             <a:endParaRPr lang="en-US"/>
           </a:p>
@@ -2228,7 +2228,7 @@
             <a:fld id="{1D8BD707-D9CF-40AE-B4C6-C98DA3205C09}" type="datetimeFigureOut">
               <a:rPr lang="en-US" smtClean="0"/>
               <a:pPr/>
-              <a:t>8/27/12</a:t>
+              <a:t>8/31/12</a:t>
             </a:fld>
             <a:endParaRPr lang="en-US"/>
           </a:p>
@@ -2478,7 +2478,7 @@
             <a:fld id="{1D8BD707-D9CF-40AE-B4C6-C98DA3205C09}" type="datetimeFigureOut">
               <a:rPr lang="en-US" smtClean="0"/>
               <a:pPr/>
-              <a:t>8/27/12</a:t>
+              <a:t>8/31/12</a:t>
             </a:fld>
             <a:endParaRPr lang="en-US"/>
           </a:p>
@@ -2688,7 +2688,7 @@
             <a:fld id="{1D8BD707-D9CF-40AE-B4C6-C98DA3205C09}" type="datetimeFigureOut">
               <a:rPr lang="en-US" smtClean="0"/>
               <a:pPr/>
-              <a:t>8/27/12</a:t>
+              <a:t>8/31/12</a:t>
             </a:fld>
             <a:endParaRPr lang="en-US"/>
           </a:p>
@@ -5170,18 +5170,7 @@
                   </a:schemeClr>
                 </a:solidFill>
               </a:rPr>
-              <a:t>L</a:t>
-            </a:r>
-            <a:r>
-              <a:rPr lang="en-US" sz="1000" b="1" dirty="0" smtClean="0">
-                <a:solidFill>
-                  <a:schemeClr val="tx1">
-                    <a:lumMod val="95000"/>
-                    <a:lumOff val="5000"/>
-                  </a:schemeClr>
-                </a:solidFill>
-              </a:rPr>
-              <a:t>ink</a:t>
+              <a:t>Link</a:t>
             </a:r>
             <a:endParaRPr lang="en-US" sz="1000" b="1" dirty="0">
               <a:solidFill>
@@ -5203,7 +5192,7 @@
         <p:spPr>
           <a:xfrm>
             <a:off x="2590800" y="304800"/>
-            <a:ext cx="1371600" cy="152400"/>
+            <a:ext cx="1447800" cy="152400"/>
           </a:xfrm>
           <a:prstGeom prst="callout2">
             <a:avLst>
@@ -5243,7 +5232,7 @@
           <a:lstStyle/>
           <a:p>
             <a:r>
-              <a:rPr lang="en-US" sz="1050" b="1" dirty="0" err="1" smtClean="0">
+              <a:rPr lang="en-US" sz="1050" b="1" dirty="0" smtClean="0">
                 <a:solidFill>
                   <a:schemeClr val="tx1">
                     <a:lumMod val="95000"/>
@@ -5251,7 +5240,7 @@
                   </a:schemeClr>
                 </a:solidFill>
               </a:rPr>
-              <a:t>linkNego</a:t>
+              <a:t>(</a:t>
             </a:r>
             <a:r>
               <a:rPr lang="en-US" sz="1050" b="1" dirty="0" err="1" smtClean="0">
@@ -5262,7 +5251,18 @@
                   </a:schemeClr>
                 </a:solidFill>
               </a:rPr>
-              <a:t>tiationStart</a:t>
+              <a:t>linkNegotiationStart</a:t>
+            </a:r>
+            <a:r>
+              <a:rPr lang="en-US" sz="1050" b="1" dirty="0" smtClean="0">
+                <a:solidFill>
+                  <a:schemeClr val="tx1">
+                    <a:lumMod val="95000"/>
+                    <a:lumOff val="5000"/>
+                  </a:schemeClr>
+                </a:solidFill>
+              </a:rPr>
+              <a:t>)</a:t>
             </a:r>
             <a:endParaRPr lang="en-US" sz="1050" b="1" dirty="0">
               <a:solidFill>
@@ -5324,7 +5324,7 @@
           <a:lstStyle/>
           <a:p>
             <a:r>
-              <a:rPr lang="en-US" sz="1050" b="1" dirty="0" err="1" smtClean="0">
+              <a:rPr lang="en-US" sz="1050" b="1" dirty="0" smtClean="0">
                 <a:solidFill>
                   <a:schemeClr val="tx1">
                     <a:lumMod val="95000"/>
@@ -5332,7 +5332,7 @@
                   </a:schemeClr>
                 </a:solidFill>
               </a:rPr>
-              <a:t>linkNego</a:t>
+              <a:t>(</a:t>
             </a:r>
             <a:r>
               <a:rPr lang="en-US" sz="1050" b="1" dirty="0" err="1" smtClean="0">
@@ -5343,7 +5343,18 @@
                   </a:schemeClr>
                 </a:solidFill>
               </a:rPr>
-              <a:t>tiationEnd</a:t>
+              <a:t>linkNegotiationEnd</a:t>
+            </a:r>
+            <a:r>
+              <a:rPr lang="en-US" sz="1050" b="1" dirty="0" smtClean="0">
+                <a:solidFill>
+                  <a:schemeClr val="tx1">
+                    <a:lumMod val="95000"/>
+                    <a:lumOff val="5000"/>
+                  </a:schemeClr>
+                </a:solidFill>
+              </a:rPr>
+              <a:t>)</a:t>
             </a:r>
             <a:endParaRPr lang="en-US" sz="1050" b="1" dirty="0">
               <a:solidFill>
@@ -5359,7 +5370,7 @@
     </p:spTree>
     <p:extLst>
       <p:ext uri="{BB962C8B-B14F-4D97-AF65-F5344CB8AC3E}">
-        <p14:creationId xmlns="" xmlns:p14="http://schemas.microsoft.com/office/powerpoint/2010/main" xmlns:p="http://schemas.openxmlformats.org/presentationml/2006/main" xmlns:r="http://schemas.openxmlformats.org/officeDocument/2006/relationships" xmlns:a="http://schemas.openxmlformats.org/drawingml/2006/main" val="3625791706"/>
+        <p14:creationId xmlns:a="http://schemas.openxmlformats.org/drawingml/2006/main" xmlns:r="http://schemas.openxmlformats.org/officeDocument/2006/relationships" xmlns:p="http://schemas.openxmlformats.org/presentationml/2006/main" xmlns:p14="http://schemas.microsoft.com/office/powerpoint/2010/main" xmlns="" xmlns:mv="urn:schemas-microsoft-com:mac:vml" xmlns:mc="http://schemas.openxmlformats.org/markup-compatibility/2006" val="3625791706"/>
       </p:ext>
     </p:extLst>
   </p:cSld>

</xml_diff>